<commit_message>
Actualizar PresentacionProyecto.pptx con nuevos contenidos
</commit_message>
<xml_diff>
--- a/PresentacionProyecto.pptx
+++ b/PresentacionProyecto.pptx
@@ -5,15 +5,15 @@
     <p:sldMasterId id="2147483648" r:id="rId1"/>
   </p:sldMasterIdLst>
   <p:sldIdLst>
-    <p:sldId id="256" r:id="rId7"/>
-    <p:sldId id="257" r:id="rId8"/>
-    <p:sldId id="258" r:id="rId9"/>
-    <p:sldId id="259" r:id="rId10"/>
-    <p:sldId id="260" r:id="rId11"/>
-    <p:sldId id="261" r:id="rId12"/>
-    <p:sldId id="262" r:id="rId13"/>
-    <p:sldId id="263" r:id="rId14"/>
-    <p:sldId id="264" r:id="rId15"/>
+    <p:sldId id="256" r:id="rId2"/>
+    <p:sldId id="265" r:id="rId3"/>
+    <p:sldId id="266" r:id="rId4"/>
+    <p:sldId id="267" r:id="rId5"/>
+    <p:sldId id="268" r:id="rId6"/>
+    <p:sldId id="269" r:id="rId7"/>
+    <p:sldId id="270" r:id="rId8"/>
+    <p:sldId id="271" r:id="rId9"/>
+    <p:sldId id="272" r:id="rId10"/>
   </p:sldIdLst>
   <p:sldSz cx="9144000" cy="6858000" type="screen4x3"/>
   <p:notesSz cx="6858000" cy="9144000"/>
@@ -112,6 +112,22 @@
       </a:defRPr>
     </a:lvl9pPr>
   </p:defaultTextStyle>
+  <p:extLst>
+    <p:ext uri="{EFAFB233-063F-42B5-8137-9DF3F51BA10A}">
+      <p15:sldGuideLst xmlns:p15="http://schemas.microsoft.com/office/powerpoint/2012/main">
+        <p15:guide id="1" orient="horz" pos="2160">
+          <p15:clr>
+            <a:srgbClr val="A4A3A4"/>
+          </p15:clr>
+        </p15:guide>
+        <p15:guide id="2" pos="2880">
+          <p15:clr>
+            <a:srgbClr val="A4A3A4"/>
+          </p15:clr>
+        </p15:guide>
+      </p15:sldGuideLst>
+    </p:ext>
+  </p:extLst>
 </p:presentation>
 </file>
 
@@ -153,10 +169,9 @@
           <a:lstStyle/>
           <a:p>
             <a:r>
-              <a:rPr lang="en-US" smtClean="0"/>
+              <a:rPr lang="en-US"/>
               <a:t>Click to edit Master title style</a:t>
             </a:r>
-            <a:endParaRPr lang="en-US"/>
           </a:p>
         </p:txBody>
       </p:sp>
@@ -272,10 +287,9 @@
           </a:lstStyle>
           <a:p>
             <a:r>
-              <a:rPr lang="en-US" smtClean="0"/>
+              <a:rPr lang="en-US"/>
               <a:t>Click to edit Master subtitle style</a:t>
             </a:r>
-            <a:endParaRPr lang="en-US"/>
           </a:p>
         </p:txBody>
       </p:sp>
@@ -296,7 +310,7 @@
           <a:p>
             <a:fld id="{5BCAD085-E8A6-8845-BD4E-CB4CCA059FC4}" type="datetimeFigureOut">
               <a:rPr lang="en-US" smtClean="0"/>
-              <a:t>1/27/13</a:t>
+              <a:t>2/17/2026</a:t>
             </a:fld>
             <a:endParaRPr lang="en-US"/>
           </a:p>
@@ -338,7 +352,7 @@
           <a:p>
             <a:fld id="{C1FF6DA9-008F-8B48-92A6-B652298478BF}" type="slidenum">
               <a:rPr lang="en-US" smtClean="0"/>
-              <a:t>‹#›</a:t>
+              <a:t>‹Nº›</a:t>
             </a:fld>
             <a:endParaRPr lang="en-US"/>
           </a:p>
@@ -390,10 +404,9 @@
           <a:lstStyle/>
           <a:p>
             <a:r>
-              <a:rPr lang="en-US" smtClean="0"/>
+              <a:rPr lang="en-US"/>
               <a:t>Click to edit Master title style</a:t>
             </a:r>
-            <a:endParaRPr lang="en-US"/>
           </a:p>
         </p:txBody>
       </p:sp>
@@ -414,38 +427,37 @@
           <a:p>
             <a:pPr lvl="0"/>
             <a:r>
-              <a:rPr lang="en-US" smtClean="0"/>
+              <a:rPr lang="en-US"/>
               <a:t>Click to edit Master text styles</a:t>
             </a:r>
           </a:p>
           <a:p>
             <a:pPr lvl="1"/>
             <a:r>
-              <a:rPr lang="en-US" smtClean="0"/>
+              <a:rPr lang="en-US"/>
               <a:t>Second level</a:t>
             </a:r>
           </a:p>
           <a:p>
             <a:pPr lvl="2"/>
             <a:r>
-              <a:rPr lang="en-US" smtClean="0"/>
+              <a:rPr lang="en-US"/>
               <a:t>Third level</a:t>
             </a:r>
           </a:p>
           <a:p>
             <a:pPr lvl="3"/>
             <a:r>
-              <a:rPr lang="en-US" smtClean="0"/>
+              <a:rPr lang="en-US"/>
               <a:t>Fourth level</a:t>
             </a:r>
           </a:p>
           <a:p>
             <a:pPr lvl="4"/>
             <a:r>
-              <a:rPr lang="en-US" smtClean="0"/>
+              <a:rPr lang="en-US"/>
               <a:t>Fifth level</a:t>
             </a:r>
-            <a:endParaRPr lang="en-US"/>
           </a:p>
         </p:txBody>
       </p:sp>
@@ -466,7 +478,7 @@
           <a:p>
             <a:fld id="{5BCAD085-E8A6-8845-BD4E-CB4CCA059FC4}" type="datetimeFigureOut">
               <a:rPr lang="en-US" smtClean="0"/>
-              <a:t>1/27/13</a:t>
+              <a:t>2/17/2026</a:t>
             </a:fld>
             <a:endParaRPr lang="en-US"/>
           </a:p>
@@ -508,7 +520,7 @@
           <a:p>
             <a:fld id="{C1FF6DA9-008F-8B48-92A6-B652298478BF}" type="slidenum">
               <a:rPr lang="en-US" smtClean="0"/>
-              <a:t>‹#›</a:t>
+              <a:t>‹Nº›</a:t>
             </a:fld>
             <a:endParaRPr lang="en-US"/>
           </a:p>
@@ -565,10 +577,9 @@
           <a:lstStyle/>
           <a:p>
             <a:r>
-              <a:rPr lang="en-US" smtClean="0"/>
+              <a:rPr lang="en-US"/>
               <a:t>Click to edit Master title style</a:t>
             </a:r>
-            <a:endParaRPr lang="en-US"/>
           </a:p>
         </p:txBody>
       </p:sp>
@@ -594,38 +605,37 @@
           <a:p>
             <a:pPr lvl="0"/>
             <a:r>
-              <a:rPr lang="en-US" smtClean="0"/>
+              <a:rPr lang="en-US"/>
               <a:t>Click to edit Master text styles</a:t>
             </a:r>
           </a:p>
           <a:p>
             <a:pPr lvl="1"/>
             <a:r>
-              <a:rPr lang="en-US" smtClean="0"/>
+              <a:rPr lang="en-US"/>
               <a:t>Second level</a:t>
             </a:r>
           </a:p>
           <a:p>
             <a:pPr lvl="2"/>
             <a:r>
-              <a:rPr lang="en-US" smtClean="0"/>
+              <a:rPr lang="en-US"/>
               <a:t>Third level</a:t>
             </a:r>
           </a:p>
           <a:p>
             <a:pPr lvl="3"/>
             <a:r>
-              <a:rPr lang="en-US" smtClean="0"/>
+              <a:rPr lang="en-US"/>
               <a:t>Fourth level</a:t>
             </a:r>
           </a:p>
           <a:p>
             <a:pPr lvl="4"/>
             <a:r>
-              <a:rPr lang="en-US" smtClean="0"/>
+              <a:rPr lang="en-US"/>
               <a:t>Fifth level</a:t>
             </a:r>
-            <a:endParaRPr lang="en-US"/>
           </a:p>
         </p:txBody>
       </p:sp>
@@ -646,7 +656,7 @@
           <a:p>
             <a:fld id="{5BCAD085-E8A6-8845-BD4E-CB4CCA059FC4}" type="datetimeFigureOut">
               <a:rPr lang="en-US" smtClean="0"/>
-              <a:t>1/27/13</a:t>
+              <a:t>2/17/2026</a:t>
             </a:fld>
             <a:endParaRPr lang="en-US"/>
           </a:p>
@@ -688,7 +698,7 @@
           <a:p>
             <a:fld id="{C1FF6DA9-008F-8B48-92A6-B652298478BF}" type="slidenum">
               <a:rPr lang="en-US" smtClean="0"/>
-              <a:t>‹#›</a:t>
+              <a:t>‹Nº›</a:t>
             </a:fld>
             <a:endParaRPr lang="en-US"/>
           </a:p>
@@ -740,10 +750,9 @@
           <a:lstStyle/>
           <a:p>
             <a:r>
-              <a:rPr lang="en-US" smtClean="0"/>
+              <a:rPr lang="en-US"/>
               <a:t>Click to edit Master title style</a:t>
             </a:r>
-            <a:endParaRPr lang="en-US"/>
           </a:p>
         </p:txBody>
       </p:sp>
@@ -764,38 +773,37 @@
           <a:p>
             <a:pPr lvl="0"/>
             <a:r>
-              <a:rPr lang="en-US" smtClean="0"/>
+              <a:rPr lang="en-US"/>
               <a:t>Click to edit Master text styles</a:t>
             </a:r>
           </a:p>
           <a:p>
             <a:pPr lvl="1"/>
             <a:r>
-              <a:rPr lang="en-US" smtClean="0"/>
+              <a:rPr lang="en-US"/>
               <a:t>Second level</a:t>
             </a:r>
           </a:p>
           <a:p>
             <a:pPr lvl="2"/>
             <a:r>
-              <a:rPr lang="en-US" smtClean="0"/>
+              <a:rPr lang="en-US"/>
               <a:t>Third level</a:t>
             </a:r>
           </a:p>
           <a:p>
             <a:pPr lvl="3"/>
             <a:r>
-              <a:rPr lang="en-US" smtClean="0"/>
+              <a:rPr lang="en-US"/>
               <a:t>Fourth level</a:t>
             </a:r>
           </a:p>
           <a:p>
             <a:pPr lvl="4"/>
             <a:r>
-              <a:rPr lang="en-US" smtClean="0"/>
+              <a:rPr lang="en-US"/>
               <a:t>Fifth level</a:t>
             </a:r>
-            <a:endParaRPr lang="en-US"/>
           </a:p>
         </p:txBody>
       </p:sp>
@@ -816,7 +824,7 @@
           <a:p>
             <a:fld id="{5BCAD085-E8A6-8845-BD4E-CB4CCA059FC4}" type="datetimeFigureOut">
               <a:rPr lang="en-US" smtClean="0"/>
-              <a:t>1/27/13</a:t>
+              <a:t>2/17/2026</a:t>
             </a:fld>
             <a:endParaRPr lang="en-US"/>
           </a:p>
@@ -858,7 +866,7 @@
           <a:p>
             <a:fld id="{C1FF6DA9-008F-8B48-92A6-B652298478BF}" type="slidenum">
               <a:rPr lang="en-US" smtClean="0"/>
-              <a:t>‹#›</a:t>
+              <a:t>‹Nº›</a:t>
             </a:fld>
             <a:endParaRPr lang="en-US"/>
           </a:p>
@@ -919,10 +927,9 @@
           </a:lstStyle>
           <a:p>
             <a:r>
-              <a:rPr lang="en-US" smtClean="0"/>
+              <a:rPr lang="en-US"/>
               <a:t>Click to edit Master title style</a:t>
             </a:r>
-            <a:endParaRPr lang="en-US"/>
           </a:p>
         </p:txBody>
       </p:sp>
@@ -1039,7 +1046,7 @@
           <a:p>
             <a:pPr lvl="0"/>
             <a:r>
-              <a:rPr lang="en-US" smtClean="0"/>
+              <a:rPr lang="en-US"/>
               <a:t>Click to edit Master text styles</a:t>
             </a:r>
           </a:p>
@@ -1062,7 +1069,7 @@
           <a:p>
             <a:fld id="{5BCAD085-E8A6-8845-BD4E-CB4CCA059FC4}" type="datetimeFigureOut">
               <a:rPr lang="en-US" smtClean="0"/>
-              <a:t>1/27/13</a:t>
+              <a:t>2/17/2026</a:t>
             </a:fld>
             <a:endParaRPr lang="en-US"/>
           </a:p>
@@ -1104,7 +1111,7 @@
           <a:p>
             <a:fld id="{C1FF6DA9-008F-8B48-92A6-B652298478BF}" type="slidenum">
               <a:rPr lang="en-US" smtClean="0"/>
-              <a:t>‹#›</a:t>
+              <a:t>‹Nº›</a:t>
             </a:fld>
             <a:endParaRPr lang="en-US"/>
           </a:p>
@@ -1156,10 +1163,9 @@
           <a:lstStyle/>
           <a:p>
             <a:r>
-              <a:rPr lang="en-US" smtClean="0"/>
+              <a:rPr lang="en-US"/>
               <a:t>Click to edit Master title style</a:t>
             </a:r>
-            <a:endParaRPr lang="en-US"/>
           </a:p>
         </p:txBody>
       </p:sp>
@@ -1213,38 +1219,37 @@
           <a:p>
             <a:pPr lvl="0"/>
             <a:r>
-              <a:rPr lang="en-US" smtClean="0"/>
+              <a:rPr lang="en-US"/>
               <a:t>Click to edit Master text styles</a:t>
             </a:r>
           </a:p>
           <a:p>
             <a:pPr lvl="1"/>
             <a:r>
-              <a:rPr lang="en-US" smtClean="0"/>
+              <a:rPr lang="en-US"/>
               <a:t>Second level</a:t>
             </a:r>
           </a:p>
           <a:p>
             <a:pPr lvl="2"/>
             <a:r>
-              <a:rPr lang="en-US" smtClean="0"/>
+              <a:rPr lang="en-US"/>
               <a:t>Third level</a:t>
             </a:r>
           </a:p>
           <a:p>
             <a:pPr lvl="3"/>
             <a:r>
-              <a:rPr lang="en-US" smtClean="0"/>
+              <a:rPr lang="en-US"/>
               <a:t>Fourth level</a:t>
             </a:r>
           </a:p>
           <a:p>
             <a:pPr lvl="4"/>
             <a:r>
-              <a:rPr lang="en-US" smtClean="0"/>
+              <a:rPr lang="en-US"/>
               <a:t>Fifth level</a:t>
             </a:r>
-            <a:endParaRPr lang="en-US"/>
           </a:p>
         </p:txBody>
       </p:sp>
@@ -1298,38 +1303,37 @@
           <a:p>
             <a:pPr lvl="0"/>
             <a:r>
-              <a:rPr lang="en-US" smtClean="0"/>
+              <a:rPr lang="en-US"/>
               <a:t>Click to edit Master text styles</a:t>
             </a:r>
           </a:p>
           <a:p>
             <a:pPr lvl="1"/>
             <a:r>
-              <a:rPr lang="en-US" smtClean="0"/>
+              <a:rPr lang="en-US"/>
               <a:t>Second level</a:t>
             </a:r>
           </a:p>
           <a:p>
             <a:pPr lvl="2"/>
             <a:r>
-              <a:rPr lang="en-US" smtClean="0"/>
+              <a:rPr lang="en-US"/>
               <a:t>Third level</a:t>
             </a:r>
           </a:p>
           <a:p>
             <a:pPr lvl="3"/>
             <a:r>
-              <a:rPr lang="en-US" smtClean="0"/>
+              <a:rPr lang="en-US"/>
               <a:t>Fourth level</a:t>
             </a:r>
           </a:p>
           <a:p>
             <a:pPr lvl="4"/>
             <a:r>
-              <a:rPr lang="en-US" smtClean="0"/>
+              <a:rPr lang="en-US"/>
               <a:t>Fifth level</a:t>
             </a:r>
-            <a:endParaRPr lang="en-US"/>
           </a:p>
         </p:txBody>
       </p:sp>
@@ -1350,7 +1354,7 @@
           <a:p>
             <a:fld id="{5BCAD085-E8A6-8845-BD4E-CB4CCA059FC4}" type="datetimeFigureOut">
               <a:rPr lang="en-US" smtClean="0"/>
-              <a:t>1/27/13</a:t>
+              <a:t>2/17/2026</a:t>
             </a:fld>
             <a:endParaRPr lang="en-US"/>
           </a:p>
@@ -1392,7 +1396,7 @@
           <a:p>
             <a:fld id="{C1FF6DA9-008F-8B48-92A6-B652298478BF}" type="slidenum">
               <a:rPr lang="en-US" smtClean="0"/>
-              <a:t>‹#›</a:t>
+              <a:t>‹Nº›</a:t>
             </a:fld>
             <a:endParaRPr lang="en-US"/>
           </a:p>
@@ -1448,10 +1452,9 @@
           </a:lstStyle>
           <a:p>
             <a:r>
-              <a:rPr lang="en-US" smtClean="0"/>
+              <a:rPr lang="en-US"/>
               <a:t>Click to edit Master title style</a:t>
             </a:r>
-            <a:endParaRPr lang="en-US"/>
           </a:p>
         </p:txBody>
       </p:sp>
@@ -1514,7 +1517,7 @@
           <a:p>
             <a:pPr lvl="0"/>
             <a:r>
-              <a:rPr lang="en-US" smtClean="0"/>
+              <a:rPr lang="en-US"/>
               <a:t>Click to edit Master text styles</a:t>
             </a:r>
           </a:p>
@@ -1570,38 +1573,37 @@
           <a:p>
             <a:pPr lvl="0"/>
             <a:r>
-              <a:rPr lang="en-US" smtClean="0"/>
+              <a:rPr lang="en-US"/>
               <a:t>Click to edit Master text styles</a:t>
             </a:r>
           </a:p>
           <a:p>
             <a:pPr lvl="1"/>
             <a:r>
-              <a:rPr lang="en-US" smtClean="0"/>
+              <a:rPr lang="en-US"/>
               <a:t>Second level</a:t>
             </a:r>
           </a:p>
           <a:p>
             <a:pPr lvl="2"/>
             <a:r>
-              <a:rPr lang="en-US" smtClean="0"/>
+              <a:rPr lang="en-US"/>
               <a:t>Third level</a:t>
             </a:r>
           </a:p>
           <a:p>
             <a:pPr lvl="3"/>
             <a:r>
-              <a:rPr lang="en-US" smtClean="0"/>
+              <a:rPr lang="en-US"/>
               <a:t>Fourth level</a:t>
             </a:r>
           </a:p>
           <a:p>
             <a:pPr lvl="4"/>
             <a:r>
-              <a:rPr lang="en-US" smtClean="0"/>
+              <a:rPr lang="en-US"/>
               <a:t>Fifth level</a:t>
             </a:r>
-            <a:endParaRPr lang="en-US"/>
           </a:p>
         </p:txBody>
       </p:sp>
@@ -1664,7 +1666,7 @@
           <a:p>
             <a:pPr lvl="0"/>
             <a:r>
-              <a:rPr lang="en-US" smtClean="0"/>
+              <a:rPr lang="en-US"/>
               <a:t>Click to edit Master text styles</a:t>
             </a:r>
           </a:p>
@@ -1720,38 +1722,37 @@
           <a:p>
             <a:pPr lvl="0"/>
             <a:r>
-              <a:rPr lang="en-US" smtClean="0"/>
+              <a:rPr lang="en-US"/>
               <a:t>Click to edit Master text styles</a:t>
             </a:r>
           </a:p>
           <a:p>
             <a:pPr lvl="1"/>
             <a:r>
-              <a:rPr lang="en-US" smtClean="0"/>
+              <a:rPr lang="en-US"/>
               <a:t>Second level</a:t>
             </a:r>
           </a:p>
           <a:p>
             <a:pPr lvl="2"/>
             <a:r>
-              <a:rPr lang="en-US" smtClean="0"/>
+              <a:rPr lang="en-US"/>
               <a:t>Third level</a:t>
             </a:r>
           </a:p>
           <a:p>
             <a:pPr lvl="3"/>
             <a:r>
-              <a:rPr lang="en-US" smtClean="0"/>
+              <a:rPr lang="en-US"/>
               <a:t>Fourth level</a:t>
             </a:r>
           </a:p>
           <a:p>
             <a:pPr lvl="4"/>
             <a:r>
-              <a:rPr lang="en-US" smtClean="0"/>
+              <a:rPr lang="en-US"/>
               <a:t>Fifth level</a:t>
             </a:r>
-            <a:endParaRPr lang="en-US"/>
           </a:p>
         </p:txBody>
       </p:sp>
@@ -1772,7 +1773,7 @@
           <a:p>
             <a:fld id="{5BCAD085-E8A6-8845-BD4E-CB4CCA059FC4}" type="datetimeFigureOut">
               <a:rPr lang="en-US" smtClean="0"/>
-              <a:t>1/27/13</a:t>
+              <a:t>2/17/2026</a:t>
             </a:fld>
             <a:endParaRPr lang="en-US"/>
           </a:p>
@@ -1814,7 +1815,7 @@
           <a:p>
             <a:fld id="{C1FF6DA9-008F-8B48-92A6-B652298478BF}" type="slidenum">
               <a:rPr lang="en-US" smtClean="0"/>
-              <a:t>‹#›</a:t>
+              <a:t>‹Nº›</a:t>
             </a:fld>
             <a:endParaRPr lang="en-US"/>
           </a:p>
@@ -1866,10 +1867,9 @@
           <a:lstStyle/>
           <a:p>
             <a:r>
-              <a:rPr lang="en-US" smtClean="0"/>
+              <a:rPr lang="en-US"/>
               <a:t>Click to edit Master title style</a:t>
             </a:r>
-            <a:endParaRPr lang="en-US"/>
           </a:p>
         </p:txBody>
       </p:sp>
@@ -1890,7 +1890,7 @@
           <a:p>
             <a:fld id="{5BCAD085-E8A6-8845-BD4E-CB4CCA059FC4}" type="datetimeFigureOut">
               <a:rPr lang="en-US" smtClean="0"/>
-              <a:t>1/27/13</a:t>
+              <a:t>2/17/2026</a:t>
             </a:fld>
             <a:endParaRPr lang="en-US"/>
           </a:p>
@@ -1932,7 +1932,7 @@
           <a:p>
             <a:fld id="{C1FF6DA9-008F-8B48-92A6-B652298478BF}" type="slidenum">
               <a:rPr lang="en-US" smtClean="0"/>
-              <a:t>‹#›</a:t>
+              <a:t>‹Nº›</a:t>
             </a:fld>
             <a:endParaRPr lang="en-US"/>
           </a:p>
@@ -1985,7 +1985,7 @@
           <a:p>
             <a:fld id="{5BCAD085-E8A6-8845-BD4E-CB4CCA059FC4}" type="datetimeFigureOut">
               <a:rPr lang="en-US" smtClean="0"/>
-              <a:t>1/27/13</a:t>
+              <a:t>2/17/2026</a:t>
             </a:fld>
             <a:endParaRPr lang="en-US"/>
           </a:p>
@@ -2027,7 +2027,7 @@
           <a:p>
             <a:fld id="{C1FF6DA9-008F-8B48-92A6-B652298478BF}" type="slidenum">
               <a:rPr lang="en-US" smtClean="0"/>
-              <a:t>‹#›</a:t>
+              <a:t>‹Nº›</a:t>
             </a:fld>
             <a:endParaRPr lang="en-US"/>
           </a:p>
@@ -2088,10 +2088,9 @@
           </a:lstStyle>
           <a:p>
             <a:r>
-              <a:rPr lang="en-US" smtClean="0"/>
+              <a:rPr lang="en-US"/>
               <a:t>Click to edit Master title style</a:t>
             </a:r>
-            <a:endParaRPr lang="en-US"/>
           </a:p>
         </p:txBody>
       </p:sp>
@@ -2145,38 +2144,37 @@
           <a:p>
             <a:pPr lvl="0"/>
             <a:r>
-              <a:rPr lang="en-US" smtClean="0"/>
+              <a:rPr lang="en-US"/>
               <a:t>Click to edit Master text styles</a:t>
             </a:r>
           </a:p>
           <a:p>
             <a:pPr lvl="1"/>
             <a:r>
-              <a:rPr lang="en-US" smtClean="0"/>
+              <a:rPr lang="en-US"/>
               <a:t>Second level</a:t>
             </a:r>
           </a:p>
           <a:p>
             <a:pPr lvl="2"/>
             <a:r>
-              <a:rPr lang="en-US" smtClean="0"/>
+              <a:rPr lang="en-US"/>
               <a:t>Third level</a:t>
             </a:r>
           </a:p>
           <a:p>
             <a:pPr lvl="3"/>
             <a:r>
-              <a:rPr lang="en-US" smtClean="0"/>
+              <a:rPr lang="en-US"/>
               <a:t>Fourth level</a:t>
             </a:r>
           </a:p>
           <a:p>
             <a:pPr lvl="4"/>
             <a:r>
-              <a:rPr lang="en-US" smtClean="0"/>
+              <a:rPr lang="en-US"/>
               <a:t>Fifth level</a:t>
             </a:r>
-            <a:endParaRPr lang="en-US"/>
           </a:p>
         </p:txBody>
       </p:sp>
@@ -2239,7 +2237,7 @@
           <a:p>
             <a:pPr lvl="0"/>
             <a:r>
-              <a:rPr lang="en-US" smtClean="0"/>
+              <a:rPr lang="en-US"/>
               <a:t>Click to edit Master text styles</a:t>
             </a:r>
           </a:p>
@@ -2262,7 +2260,7 @@
           <a:p>
             <a:fld id="{5BCAD085-E8A6-8845-BD4E-CB4CCA059FC4}" type="datetimeFigureOut">
               <a:rPr lang="en-US" smtClean="0"/>
-              <a:t>1/27/13</a:t>
+              <a:t>2/17/2026</a:t>
             </a:fld>
             <a:endParaRPr lang="en-US"/>
           </a:p>
@@ -2304,7 +2302,7 @@
           <a:p>
             <a:fld id="{C1FF6DA9-008F-8B48-92A6-B652298478BF}" type="slidenum">
               <a:rPr lang="en-US" smtClean="0"/>
-              <a:t>‹#›</a:t>
+              <a:t>‹Nº›</a:t>
             </a:fld>
             <a:endParaRPr lang="en-US"/>
           </a:p>
@@ -2365,10 +2363,9 @@
           </a:lstStyle>
           <a:p>
             <a:r>
-              <a:rPr lang="en-US" smtClean="0"/>
+              <a:rPr lang="en-US"/>
               <a:t>Click to edit Master title style</a:t>
             </a:r>
-            <a:endParaRPr lang="en-US"/>
           </a:p>
         </p:txBody>
       </p:sp>
@@ -2492,7 +2489,7 @@
           <a:p>
             <a:pPr lvl="0"/>
             <a:r>
-              <a:rPr lang="en-US" smtClean="0"/>
+              <a:rPr lang="en-US"/>
               <a:t>Click to edit Master text styles</a:t>
             </a:r>
           </a:p>
@@ -2515,7 +2512,7 @@
           <a:p>
             <a:fld id="{5BCAD085-E8A6-8845-BD4E-CB4CCA059FC4}" type="datetimeFigureOut">
               <a:rPr lang="en-US" smtClean="0"/>
-              <a:t>1/27/13</a:t>
+              <a:t>2/17/2026</a:t>
             </a:fld>
             <a:endParaRPr lang="en-US"/>
           </a:p>
@@ -2557,7 +2554,7 @@
           <a:p>
             <a:fld id="{C1FF6DA9-008F-8B48-92A6-B652298478BF}" type="slidenum">
               <a:rPr lang="en-US" smtClean="0"/>
-              <a:t>‹#›</a:t>
+              <a:t>‹Nº›</a:t>
             </a:fld>
             <a:endParaRPr lang="en-US"/>
           </a:p>
@@ -2624,10 +2621,9 @@
           <a:lstStyle/>
           <a:p>
             <a:r>
-              <a:rPr lang="en-US" smtClean="0"/>
+              <a:rPr lang="en-US"/>
               <a:t>Click to edit Master title style</a:t>
             </a:r>
-            <a:endParaRPr lang="en-US"/>
           </a:p>
         </p:txBody>
       </p:sp>
@@ -2658,38 +2654,37 @@
           <a:p>
             <a:pPr lvl="0"/>
             <a:r>
-              <a:rPr lang="en-US" smtClean="0"/>
+              <a:rPr lang="en-US"/>
               <a:t>Click to edit Master text styles</a:t>
             </a:r>
           </a:p>
           <a:p>
             <a:pPr lvl="1"/>
             <a:r>
-              <a:rPr lang="en-US" smtClean="0"/>
+              <a:rPr lang="en-US"/>
               <a:t>Second level</a:t>
             </a:r>
           </a:p>
           <a:p>
             <a:pPr lvl="2"/>
             <a:r>
-              <a:rPr lang="en-US" smtClean="0"/>
+              <a:rPr lang="en-US"/>
               <a:t>Third level</a:t>
             </a:r>
           </a:p>
           <a:p>
             <a:pPr lvl="3"/>
             <a:r>
-              <a:rPr lang="en-US" smtClean="0"/>
+              <a:rPr lang="en-US"/>
               <a:t>Fourth level</a:t>
             </a:r>
           </a:p>
           <a:p>
             <a:pPr lvl="4"/>
             <a:r>
-              <a:rPr lang="en-US" smtClean="0"/>
+              <a:rPr lang="en-US"/>
               <a:t>Fifth level</a:t>
             </a:r>
-            <a:endParaRPr lang="en-US"/>
           </a:p>
         </p:txBody>
       </p:sp>
@@ -2728,7 +2723,7 @@
           <a:p>
             <a:fld id="{5BCAD085-E8A6-8845-BD4E-CB4CCA059FC4}" type="datetimeFigureOut">
               <a:rPr lang="en-US" smtClean="0"/>
-              <a:t>1/27/13</a:t>
+              <a:t>2/17/2026</a:t>
             </a:fld>
             <a:endParaRPr lang="en-US"/>
           </a:p>
@@ -2806,7 +2801,7 @@
           <a:p>
             <a:fld id="{C1FF6DA9-008F-8B48-92A6-B652298478BF}" type="slidenum">
               <a:rPr lang="en-US" smtClean="0"/>
-              <a:t>‹#›</a:t>
+              <a:t>‹Nº›</a:t>
             </a:fld>
             <a:endParaRPr lang="en-US"/>
           </a:p>
@@ -3087,7 +3082,7 @@
 </file>
 
 <file path=ppt/slides/slide1.xml><?xml version="1.0" encoding="utf-8"?>
-<p:sld xmlns:a="http://schemas.openxmlformats.org/drawingml/2006/main" xmlns:p="http://schemas.openxmlformats.org/presentationml/2006/main" xmlns:r="http://schemas.openxmlformats.org/officeDocument/2006/relationships">
+<p:sld xmlns:a="http://schemas.openxmlformats.org/drawingml/2006/main" xmlns:r="http://schemas.openxmlformats.org/officeDocument/2006/relationships" xmlns:p="http://schemas.openxmlformats.org/presentationml/2006/main">
   <p:cSld>
     <p:bg>
       <p:bgPr>
@@ -3103,7 +3098,14 @@
         <p:cNvGrpSpPr/>
         <p:nvPr/>
       </p:nvGrpSpPr>
-      <p:grpSpPr/>
+      <p:grpSpPr>
+        <a:xfrm>
+          <a:off x="0" y="0"/>
+          <a:ext cx="0" cy="0"/>
+          <a:chOff x="0" y="0"/>
+          <a:chExt cx="0" cy="0"/>
+        </a:xfrm>
+      </p:grpSpPr>
       <p:sp>
         <p:nvSpPr>
           <p:cNvPr id="2" name="TextBox 1"/>
@@ -3147,7 +3149,7 @@
         </p:nvSpPr>
         <p:spPr>
           <a:xfrm>
-            <a:off x="1097280" y="2103120"/>
+            <a:off x="1097280" y="2242800"/>
             <a:ext cx="10058400" cy="4114800"/>
           </a:xfrm>
           <a:prstGeom prst="rect">
@@ -3169,7 +3171,16 @@
               </a:defRPr>
             </a:pPr>
             <a:r>
-              <a:t>Servicio de inteligencia de mercado y pricing</a:t>
+              <a:rPr dirty="0"/>
+              <a:t>Servicio de </a:t>
+            </a:r>
+            <a:r>
+              <a:rPr dirty="0" err="1"/>
+              <a:t>inteligencia</a:t>
+            </a:r>
+            <a:r>
+              <a:rPr dirty="0"/>
+              <a:t> de mercado y pricing</a:t>
             </a:r>
           </a:p>
           <a:p>
@@ -3181,7 +3192,16 @@
               </a:defRPr>
             </a:pPr>
             <a:r>
-              <a:t>para empresas del sector retail</a:t>
+              <a:rPr dirty="0"/>
+              <a:t>para </a:t>
+            </a:r>
+            <a:r>
+              <a:rPr dirty="0" err="1"/>
+              <a:t>empresas</a:t>
+            </a:r>
+            <a:r>
+              <a:rPr dirty="0"/>
+              <a:t> del sector retail</a:t>
             </a:r>
           </a:p>
         </p:txBody>
@@ -3195,23 +3215,22 @@
 </file>
 
 <file path=ppt/slides/slide2.xml><?xml version="1.0" encoding="utf-8"?>
-<p:sld xmlns:a="http://schemas.openxmlformats.org/drawingml/2006/main" xmlns:p="http://schemas.openxmlformats.org/presentationml/2006/main" xmlns:r="http://schemas.openxmlformats.org/officeDocument/2006/relationships">
+<p:sld xmlns:a="http://schemas.openxmlformats.org/drawingml/2006/main" xmlns:r="http://schemas.openxmlformats.org/officeDocument/2006/relationships" xmlns:p="http://schemas.openxmlformats.org/presentationml/2006/main">
   <p:cSld>
-    <p:bg>
-      <p:bgPr>
-        <a:solidFill>
-          <a:srgbClr val="F5F7FA"/>
-        </a:solidFill>
-        <a:effectLst/>
-      </p:bgPr>
-    </p:bg>
     <p:spTree>
       <p:nvGrpSpPr>
         <p:cNvPr id="1" name=""/>
         <p:cNvGrpSpPr/>
         <p:nvPr/>
       </p:nvGrpSpPr>
-      <p:grpSpPr/>
+      <p:grpSpPr>
+        <a:xfrm>
+          <a:off x="0" y="0"/>
+          <a:ext cx="0" cy="0"/>
+          <a:chOff x="0" y="0"/>
+          <a:chExt cx="0" cy="0"/>
+        </a:xfrm>
+      </p:grpSpPr>
       <p:sp>
         <p:nvSpPr>
           <p:cNvPr id="2" name="TextBox 1"/>
@@ -3235,7 +3254,7 @@
           <a:lstStyle/>
           <a:p>
             <a:pPr algn="l">
-              <a:defRPr sz="3200" b="1">
+              <a:defRPr sz="3400" b="1">
                 <a:solidFill>
                   <a:srgbClr val="284678"/>
                 </a:solidFill>
@@ -3255,8 +3274,8 @@
         </p:nvSpPr>
         <p:spPr>
           <a:xfrm>
-            <a:off x="1097280" y="2103120"/>
-            <a:ext cx="10058400" cy="4114800"/>
+            <a:off x="1097280" y="1737360"/>
+            <a:ext cx="10058400" cy="731520"/>
           </a:xfrm>
           <a:prstGeom prst="rect">
             <a:avLst/>
@@ -3270,51 +3289,196 @@
           <a:lstStyle/>
           <a:p>
             <a:pPr>
-              <a:defRPr sz="2000">
-                <a:solidFill>
-                  <a:srgbClr val="3C3C3C"/>
-                </a:solidFill>
-              </a:defRPr>
-            </a:pPr>
-            <a:r>
-              <a:t>Escasa visibilidad continua del mercado online</a:t>
-            </a:r>
-          </a:p>
-          <a:p>
-            <a:pPr>
-              <a:defRPr sz="2000">
-                <a:solidFill>
-                  <a:srgbClr val="3C3C3C"/>
-                </a:solidFill>
-              </a:defRPr>
-            </a:pPr>
-            <a:r>
-              <a:t>Dificultad para comparar precios y promociones entre retailers</a:t>
-            </a:r>
-          </a:p>
-          <a:p>
-            <a:pPr>
-              <a:defRPr sz="2000">
-                <a:solidFill>
-                  <a:srgbClr val="3C3C3C"/>
-                </a:solidFill>
-              </a:defRPr>
-            </a:pPr>
-            <a:r>
-              <a:t>Diferencias relevantes por zona geográfica poco visibles</a:t>
-            </a:r>
-          </a:p>
-          <a:p>
-            <a:pPr>
-              <a:defRPr sz="2000">
-                <a:solidFill>
-                  <a:srgbClr val="3C3C3C"/>
-                </a:solidFill>
-              </a:defRPr>
-            </a:pPr>
-            <a:r>
-              <a:t>Información pública dispersa y sin estructurar</a:t>
-            </a:r>
+              <a:defRPr sz="1800">
+                <a:solidFill>
+                  <a:srgbClr val="5A6E96"/>
+                </a:solidFill>
+              </a:defRPr>
+            </a:pPr>
+            <a:r>
+              <a:t>Falta de visibilidad real del mercado online</a:t>
+            </a:r>
+          </a:p>
+        </p:txBody>
+      </p:sp>
+      <p:sp>
+        <p:nvSpPr>
+          <p:cNvPr id="4" name="TextBox 3"/>
+          <p:cNvSpPr txBox="1"/>
+          <p:nvPr/>
+        </p:nvSpPr>
+        <p:spPr>
+          <a:xfrm>
+            <a:off x="1097280" y="2242800"/>
+            <a:ext cx="7047507" cy="1323439"/>
+          </a:xfrm>
+          <a:prstGeom prst="rect">
+            <a:avLst/>
+          </a:prstGeom>
+          <a:noFill/>
+        </p:spPr>
+        <p:txBody>
+          <a:bodyPr wrap="none">
+            <a:spAutoFit/>
+          </a:bodyPr>
+          <a:lstStyle/>
+          <a:p>
+            <a:pPr marL="342900" indent="-342900">
+              <a:buFont typeface="Arial" panose="020B0604020202020204" pitchFamily="34" charset="0"/>
+              <a:buChar char="•"/>
+              <a:defRPr sz="2000">
+                <a:solidFill>
+                  <a:srgbClr val="3C3C3C"/>
+                </a:solidFill>
+              </a:defRPr>
+            </a:pPr>
+            <a:r>
+              <a:rPr dirty="0" err="1"/>
+              <a:t>Escasa</a:t>
+            </a:r>
+            <a:r>
+              <a:rPr dirty="0"/>
+              <a:t> </a:t>
+            </a:r>
+            <a:r>
+              <a:rPr dirty="0" err="1"/>
+              <a:t>visibilidad</a:t>
+            </a:r>
+            <a:r>
+              <a:rPr dirty="0"/>
+              <a:t> continua del mercado online</a:t>
+            </a:r>
+          </a:p>
+          <a:p>
+            <a:pPr marL="342900" indent="-342900">
+              <a:buFont typeface="Arial" panose="020B0604020202020204" pitchFamily="34" charset="0"/>
+              <a:buChar char="•"/>
+              <a:defRPr sz="2000">
+                <a:solidFill>
+                  <a:srgbClr val="3C3C3C"/>
+                </a:solidFill>
+              </a:defRPr>
+            </a:pPr>
+            <a:r>
+              <a:rPr dirty="0" err="1"/>
+              <a:t>Dificultad</a:t>
+            </a:r>
+            <a:r>
+              <a:rPr dirty="0"/>
+              <a:t> para </a:t>
+            </a:r>
+            <a:r>
+              <a:rPr dirty="0" err="1"/>
+              <a:t>comparar</a:t>
+            </a:r>
+            <a:r>
+              <a:rPr dirty="0"/>
+              <a:t> </a:t>
+            </a:r>
+            <a:r>
+              <a:rPr dirty="0" err="1"/>
+              <a:t>precios</a:t>
+            </a:r>
+            <a:r>
+              <a:rPr dirty="0"/>
+              <a:t> y </a:t>
+            </a:r>
+            <a:r>
+              <a:rPr dirty="0" err="1"/>
+              <a:t>promociones</a:t>
+            </a:r>
+            <a:r>
+              <a:rPr dirty="0"/>
+              <a:t> entre retailers</a:t>
+            </a:r>
+          </a:p>
+          <a:p>
+            <a:pPr marL="342900" indent="-342900">
+              <a:buFont typeface="Arial" panose="020B0604020202020204" pitchFamily="34" charset="0"/>
+              <a:buChar char="•"/>
+              <a:defRPr sz="2000">
+                <a:solidFill>
+                  <a:srgbClr val="3C3C3C"/>
+                </a:solidFill>
+              </a:defRPr>
+            </a:pPr>
+            <a:r>
+              <a:rPr dirty="0" err="1"/>
+              <a:t>Diferencias</a:t>
+            </a:r>
+            <a:r>
+              <a:rPr dirty="0"/>
+              <a:t> </a:t>
+            </a:r>
+            <a:r>
+              <a:rPr dirty="0" err="1"/>
+              <a:t>relevantes</a:t>
+            </a:r>
+            <a:r>
+              <a:rPr dirty="0"/>
+              <a:t> </a:t>
+            </a:r>
+            <a:r>
+              <a:rPr dirty="0" err="1"/>
+              <a:t>por</a:t>
+            </a:r>
+            <a:r>
+              <a:rPr dirty="0"/>
+              <a:t> zona </a:t>
+            </a:r>
+            <a:r>
+              <a:rPr dirty="0" err="1"/>
+              <a:t>geográfica</a:t>
+            </a:r>
+            <a:r>
+              <a:rPr dirty="0"/>
+              <a:t> poco </a:t>
+            </a:r>
+            <a:r>
+              <a:rPr dirty="0" err="1"/>
+              <a:t>visibles</a:t>
+            </a:r>
+            <a:endParaRPr dirty="0"/>
+          </a:p>
+          <a:p>
+            <a:pPr marL="342900" indent="-342900">
+              <a:buFont typeface="Arial" panose="020B0604020202020204" pitchFamily="34" charset="0"/>
+              <a:buChar char="•"/>
+              <a:defRPr sz="2000">
+                <a:solidFill>
+                  <a:srgbClr val="3C3C3C"/>
+                </a:solidFill>
+              </a:defRPr>
+            </a:pPr>
+            <a:r>
+              <a:rPr dirty="0" err="1"/>
+              <a:t>Información</a:t>
+            </a:r>
+            <a:r>
+              <a:rPr dirty="0"/>
+              <a:t> </a:t>
+            </a:r>
+            <a:r>
+              <a:rPr dirty="0" err="1"/>
+              <a:t>pública</a:t>
+            </a:r>
+            <a:r>
+              <a:rPr dirty="0"/>
+              <a:t> </a:t>
+            </a:r>
+            <a:r>
+              <a:rPr dirty="0" err="1"/>
+              <a:t>dispersa</a:t>
+            </a:r>
+            <a:r>
+              <a:rPr dirty="0"/>
+              <a:t> y sin </a:t>
+            </a:r>
+            <a:r>
+              <a:rPr dirty="0" err="1"/>
+              <a:t>estructurar</a:t>
+            </a:r>
+            <a:endParaRPr dirty="0"/>
           </a:p>
         </p:txBody>
       </p:sp>
@@ -3327,23 +3491,22 @@
 </file>
 
 <file path=ppt/slides/slide3.xml><?xml version="1.0" encoding="utf-8"?>
-<p:sld xmlns:a="http://schemas.openxmlformats.org/drawingml/2006/main" xmlns:p="http://schemas.openxmlformats.org/presentationml/2006/main" xmlns:r="http://schemas.openxmlformats.org/officeDocument/2006/relationships">
+<p:sld xmlns:a="http://schemas.openxmlformats.org/drawingml/2006/main" xmlns:r="http://schemas.openxmlformats.org/officeDocument/2006/relationships" xmlns:p="http://schemas.openxmlformats.org/presentationml/2006/main">
   <p:cSld>
-    <p:bg>
-      <p:bgPr>
-        <a:solidFill>
-          <a:srgbClr val="F5F7FA"/>
-        </a:solidFill>
-        <a:effectLst/>
-      </p:bgPr>
-    </p:bg>
     <p:spTree>
       <p:nvGrpSpPr>
         <p:cNvPr id="1" name=""/>
         <p:cNvGrpSpPr/>
         <p:nvPr/>
       </p:nvGrpSpPr>
-      <p:grpSpPr/>
+      <p:grpSpPr>
+        <a:xfrm>
+          <a:off x="0" y="0"/>
+          <a:ext cx="0" cy="0"/>
+          <a:chOff x="0" y="0"/>
+          <a:chExt cx="0" cy="0"/>
+        </a:xfrm>
+      </p:grpSpPr>
       <p:sp>
         <p:nvSpPr>
           <p:cNvPr id="2" name="TextBox 1"/>
@@ -3367,7 +3530,7 @@
           <a:lstStyle/>
           <a:p>
             <a:pPr algn="l">
-              <a:defRPr sz="3200" b="1">
+              <a:defRPr sz="3400" b="1">
                 <a:solidFill>
                   <a:srgbClr val="284678"/>
                 </a:solidFill>
@@ -3387,8 +3550,8 @@
         </p:nvSpPr>
         <p:spPr>
           <a:xfrm>
-            <a:off x="1097280" y="2103120"/>
-            <a:ext cx="10058400" cy="4114800"/>
+            <a:off x="1097280" y="1737360"/>
+            <a:ext cx="10058400" cy="822960"/>
           </a:xfrm>
           <a:prstGeom prst="rect">
             <a:avLst/>
@@ -3402,51 +3565,231 @@
           <a:lstStyle/>
           <a:p>
             <a:pPr>
-              <a:defRPr sz="2000">
-                <a:solidFill>
-                  <a:srgbClr val="3C3C3C"/>
-                </a:solidFill>
-              </a:defRPr>
-            </a:pPr>
-            <a:r>
-              <a:t>Servicio automatizado de análisis de retailers online</a:t>
-            </a:r>
-          </a:p>
-          <a:p>
-            <a:pPr>
-              <a:defRPr sz="2000">
-                <a:solidFill>
-                  <a:srgbClr val="3C3C3C"/>
-                </a:solidFill>
-              </a:defRPr>
-            </a:pPr>
-            <a:r>
-              <a:t>Recogida continua de información pública disponible</a:t>
-            </a:r>
-          </a:p>
-          <a:p>
-            <a:pPr>
-              <a:defRPr sz="2000">
-                <a:solidFill>
-                  <a:srgbClr val="3C3C3C"/>
-                </a:solidFill>
-              </a:defRPr>
-            </a:pPr>
-            <a:r>
-              <a:t>Análisis segmentado por código postal</a:t>
-            </a:r>
-          </a:p>
-          <a:p>
-            <a:pPr>
-              <a:defRPr sz="2000">
-                <a:solidFill>
-                  <a:srgbClr val="3C3C3C"/>
-                </a:solidFill>
-              </a:defRPr>
-            </a:pPr>
-            <a:r>
-              <a:t>Datos estructurados y almacenados con histórico</a:t>
-            </a:r>
+              <a:defRPr sz="1800">
+                <a:solidFill>
+                  <a:srgbClr val="5A6E96"/>
+                </a:solidFill>
+              </a:defRPr>
+            </a:pPr>
+            <a:r>
+              <a:t>Un servicio continuo para entender y comparar el mercado online</a:t>
+            </a:r>
+          </a:p>
+        </p:txBody>
+      </p:sp>
+      <p:sp>
+        <p:nvSpPr>
+          <p:cNvPr id="4" name="TextBox 3"/>
+          <p:cNvSpPr txBox="1"/>
+          <p:nvPr/>
+        </p:nvSpPr>
+        <p:spPr>
+          <a:xfrm>
+            <a:off x="1097280" y="2242800"/>
+            <a:ext cx="7132320" cy="2246769"/>
+          </a:xfrm>
+          <a:prstGeom prst="rect">
+            <a:avLst/>
+          </a:prstGeom>
+          <a:noFill/>
+        </p:spPr>
+        <p:txBody>
+          <a:bodyPr wrap="square">
+            <a:spAutoFit/>
+          </a:bodyPr>
+          <a:lstStyle/>
+          <a:p>
+            <a:pPr marL="342900" indent="-342900">
+              <a:buFont typeface="Arial" panose="020B0604020202020204" pitchFamily="34" charset="0"/>
+              <a:buChar char="•"/>
+              <a:defRPr sz="2000">
+                <a:solidFill>
+                  <a:srgbClr val="3C3C3C"/>
+                </a:solidFill>
+              </a:defRPr>
+            </a:pPr>
+            <a:r>
+              <a:rPr dirty="0"/>
+              <a:t>Servicio </a:t>
+            </a:r>
+            <a:r>
+              <a:rPr dirty="0" err="1"/>
+              <a:t>automatizado</a:t>
+            </a:r>
+            <a:r>
+              <a:rPr dirty="0"/>
+              <a:t> de </a:t>
+            </a:r>
+            <a:r>
+              <a:rPr dirty="0" err="1"/>
+              <a:t>análisis</a:t>
+            </a:r>
+            <a:r>
+              <a:rPr dirty="0"/>
+              <a:t> de retailers online</a:t>
+            </a:r>
+          </a:p>
+          <a:p>
+            <a:pPr marL="342900" indent="-342900">
+              <a:buFont typeface="Arial" panose="020B0604020202020204" pitchFamily="34" charset="0"/>
+              <a:buChar char="•"/>
+              <a:defRPr sz="2000">
+                <a:solidFill>
+                  <a:srgbClr val="3C3C3C"/>
+                </a:solidFill>
+              </a:defRPr>
+            </a:pPr>
+            <a:r>
+              <a:rPr dirty="0" err="1"/>
+              <a:t>Obtención</a:t>
+            </a:r>
+            <a:r>
+              <a:rPr dirty="0"/>
+              <a:t> continua de </a:t>
+            </a:r>
+            <a:r>
+              <a:rPr dirty="0" err="1"/>
+              <a:t>información</a:t>
+            </a:r>
+            <a:r>
+              <a:rPr dirty="0"/>
+              <a:t> </a:t>
+            </a:r>
+            <a:r>
+              <a:rPr dirty="0" err="1"/>
+              <a:t>pública</a:t>
+            </a:r>
+            <a:r>
+              <a:rPr dirty="0"/>
+              <a:t>, sin </a:t>
+            </a:r>
+            <a:r>
+              <a:rPr dirty="0" err="1"/>
+              <a:t>intervención</a:t>
+            </a:r>
+            <a:r>
+              <a:rPr dirty="0"/>
+              <a:t> manual</a:t>
+            </a:r>
+          </a:p>
+          <a:p>
+            <a:pPr marL="342900" indent="-342900">
+              <a:buFont typeface="Arial" panose="020B0604020202020204" pitchFamily="34" charset="0"/>
+              <a:buChar char="•"/>
+              <a:defRPr sz="2000">
+                <a:solidFill>
+                  <a:srgbClr val="3C3C3C"/>
+                </a:solidFill>
+              </a:defRPr>
+            </a:pPr>
+            <a:r>
+              <a:rPr dirty="0" err="1"/>
+              <a:t>Análisis</a:t>
+            </a:r>
+            <a:r>
+              <a:rPr dirty="0"/>
+              <a:t> </a:t>
+            </a:r>
+            <a:r>
+              <a:rPr dirty="0" err="1"/>
+              <a:t>segmentado</a:t>
+            </a:r>
+            <a:r>
+              <a:rPr dirty="0"/>
+              <a:t> </a:t>
+            </a:r>
+            <a:r>
+              <a:rPr dirty="0" err="1"/>
+              <a:t>por</a:t>
+            </a:r>
+            <a:r>
+              <a:rPr dirty="0"/>
+              <a:t> </a:t>
+            </a:r>
+            <a:r>
+              <a:rPr dirty="0" err="1"/>
+              <a:t>código</a:t>
+            </a:r>
+            <a:r>
+              <a:rPr dirty="0"/>
+              <a:t> postal para </a:t>
+            </a:r>
+            <a:r>
+              <a:rPr dirty="0" err="1"/>
+              <a:t>capturar</a:t>
+            </a:r>
+            <a:r>
+              <a:rPr dirty="0"/>
+              <a:t> </a:t>
+            </a:r>
+            <a:r>
+              <a:rPr dirty="0" err="1"/>
+              <a:t>diferencias</a:t>
+            </a:r>
+            <a:r>
+              <a:rPr dirty="0"/>
+              <a:t> reales </a:t>
+            </a:r>
+            <a:r>
+              <a:rPr dirty="0" err="1"/>
+              <a:t>por</a:t>
+            </a:r>
+            <a:r>
+              <a:rPr dirty="0"/>
+              <a:t> zona</a:t>
+            </a:r>
+          </a:p>
+          <a:p>
+            <a:pPr marL="342900" indent="-342900">
+              <a:buFont typeface="Arial" panose="020B0604020202020204" pitchFamily="34" charset="0"/>
+              <a:buChar char="•"/>
+              <a:defRPr sz="2000">
+                <a:solidFill>
+                  <a:srgbClr val="3C3C3C"/>
+                </a:solidFill>
+              </a:defRPr>
+            </a:pPr>
+            <a:r>
+              <a:rPr dirty="0"/>
+              <a:t>Datos </a:t>
+            </a:r>
+            <a:r>
+              <a:rPr dirty="0" err="1"/>
+              <a:t>tratados</a:t>
+            </a:r>
+            <a:r>
+              <a:rPr dirty="0"/>
+              <a:t>, </a:t>
+            </a:r>
+            <a:r>
+              <a:rPr dirty="0" err="1"/>
+              <a:t>estructurados</a:t>
+            </a:r>
+            <a:r>
+              <a:rPr dirty="0"/>
+              <a:t> y </a:t>
+            </a:r>
+            <a:r>
+              <a:rPr dirty="0" err="1"/>
+              <a:t>almacenados</a:t>
+            </a:r>
+            <a:r>
+              <a:rPr dirty="0"/>
+              <a:t> con histórico para </a:t>
+            </a:r>
+            <a:r>
+              <a:rPr dirty="0" err="1"/>
+              <a:t>análisis</a:t>
+            </a:r>
+            <a:r>
+              <a:rPr dirty="0"/>
+              <a:t> </a:t>
+            </a:r>
+            <a:r>
+              <a:rPr dirty="0" err="1"/>
+              <a:t>evolutivo</a:t>
+            </a:r>
+            <a:endParaRPr dirty="0"/>
           </a:p>
         </p:txBody>
       </p:sp>
@@ -3459,23 +3802,22 @@
 </file>
 
 <file path=ppt/slides/slide4.xml><?xml version="1.0" encoding="utf-8"?>
-<p:sld xmlns:a="http://schemas.openxmlformats.org/drawingml/2006/main" xmlns:p="http://schemas.openxmlformats.org/presentationml/2006/main" xmlns:r="http://schemas.openxmlformats.org/officeDocument/2006/relationships">
+<p:sld xmlns:a="http://schemas.openxmlformats.org/drawingml/2006/main" xmlns:r="http://schemas.openxmlformats.org/officeDocument/2006/relationships" xmlns:p="http://schemas.openxmlformats.org/presentationml/2006/main">
   <p:cSld>
-    <p:bg>
-      <p:bgPr>
-        <a:solidFill>
-          <a:srgbClr val="F5F7FA"/>
-        </a:solidFill>
-        <a:effectLst/>
-      </p:bgPr>
-    </p:bg>
     <p:spTree>
       <p:nvGrpSpPr>
         <p:cNvPr id="1" name=""/>
         <p:cNvGrpSpPr/>
         <p:nvPr/>
       </p:nvGrpSpPr>
-      <p:grpSpPr/>
+      <p:grpSpPr>
+        <a:xfrm>
+          <a:off x="0" y="0"/>
+          <a:ext cx="0" cy="0"/>
+          <a:chOff x="0" y="0"/>
+          <a:chExt cx="0" cy="0"/>
+        </a:xfrm>
+      </p:grpSpPr>
       <p:sp>
         <p:nvSpPr>
           <p:cNvPr id="2" name="TextBox 1"/>
@@ -3499,7 +3841,7 @@
           <a:lstStyle/>
           <a:p>
             <a:pPr algn="l">
-              <a:defRPr sz="3200" b="1">
+              <a:defRPr sz="3400" b="1">
                 <a:solidFill>
                   <a:srgbClr val="284678"/>
                 </a:solidFill>
@@ -3519,8 +3861,8 @@
         </p:nvSpPr>
         <p:spPr>
           <a:xfrm>
-            <a:off x="1097280" y="2103120"/>
-            <a:ext cx="10058400" cy="4114800"/>
+            <a:off x="1097280" y="1737360"/>
+            <a:ext cx="10058400" cy="822960"/>
           </a:xfrm>
           <a:prstGeom prst="rect">
             <a:avLst/>
@@ -3534,15 +3876,74 @@
           <a:lstStyle/>
           <a:p>
             <a:pPr>
-              <a:defRPr sz="2000">
-                <a:solidFill>
-                  <a:srgbClr val="3C3C3C"/>
-                </a:solidFill>
-              </a:defRPr>
-            </a:pPr>
-            <a:r>
-              <a:t>Surtido de productos por retailer</a:t>
-            </a:r>
+              <a:defRPr sz="1800">
+                <a:solidFill>
+                  <a:srgbClr val="5A6E96"/>
+                </a:solidFill>
+              </a:defRPr>
+            </a:pPr>
+            <a:r>
+              <a:t>Una visión detallada y comparable de la oferta online</a:t>
+            </a:r>
+          </a:p>
+        </p:txBody>
+      </p:sp>
+      <p:sp>
+        <p:nvSpPr>
+          <p:cNvPr id="4" name="TextBox 3"/>
+          <p:cNvSpPr txBox="1"/>
+          <p:nvPr/>
+        </p:nvSpPr>
+        <p:spPr>
+          <a:xfrm>
+            <a:off x="1097280" y="2242800"/>
+            <a:ext cx="6850966" cy="3170099"/>
+          </a:xfrm>
+          <a:prstGeom prst="rect">
+            <a:avLst/>
+          </a:prstGeom>
+          <a:noFill/>
+        </p:spPr>
+        <p:txBody>
+          <a:bodyPr wrap="square">
+            <a:spAutoFit/>
+          </a:bodyPr>
+          <a:lstStyle/>
+          <a:p>
+            <a:pPr marL="342900" indent="-342900">
+              <a:buFont typeface="Arial" panose="020B0604020202020204" pitchFamily="34" charset="0"/>
+              <a:buChar char="•"/>
+              <a:defRPr sz="2000">
+                <a:solidFill>
+                  <a:srgbClr val="3C3C3C"/>
+                </a:solidFill>
+              </a:defRPr>
+            </a:pPr>
+            <a:r>
+              <a:rPr dirty="0" err="1"/>
+              <a:t>Surtido</a:t>
+            </a:r>
+            <a:r>
+              <a:rPr dirty="0"/>
+              <a:t> de </a:t>
+            </a:r>
+            <a:r>
+              <a:rPr dirty="0" err="1"/>
+              <a:t>productos</a:t>
+            </a:r>
+            <a:r>
+              <a:rPr dirty="0"/>
+              <a:t> </a:t>
+            </a:r>
+            <a:r>
+              <a:rPr dirty="0" err="1"/>
+              <a:t>por</a:t>
+            </a:r>
+            <a:r>
+              <a:rPr dirty="0"/>
+              <a:t> retailer</a:t>
+            </a:r>
+            <a:endParaRPr lang="es-ES" dirty="0"/>
           </a:p>
           <a:p>
             <a:pPr>
@@ -3553,8 +3954,98 @@
               </a:defRPr>
             </a:pPr>
             <a:r>
-              <a:t>Precios y variaciones por zona</a:t>
-            </a:r>
+              <a:rPr lang="es-ES" dirty="0"/>
+              <a:t>	</a:t>
+            </a:r>
+            <a:r>
+              <a:rPr lang="es-ES" sz="1600" dirty="0"/>
+              <a:t>A</a:t>
+            </a:r>
+            <a:r>
+              <a:rPr sz="1600" dirty="0" err="1"/>
+              <a:t>nálisis</a:t>
+            </a:r>
+            <a:r>
+              <a:rPr sz="1600" dirty="0"/>
+              <a:t> del </a:t>
+            </a:r>
+            <a:r>
+              <a:rPr sz="1600" dirty="0" err="1"/>
+              <a:t>catálogo</a:t>
+            </a:r>
+            <a:r>
+              <a:rPr sz="1600" dirty="0"/>
+              <a:t> disponible, </a:t>
+            </a:r>
+            <a:r>
+              <a:rPr sz="1600" dirty="0" err="1"/>
+              <a:t>amplitud</a:t>
+            </a:r>
+            <a:r>
+              <a:rPr sz="1600" dirty="0"/>
+              <a:t> y </a:t>
+            </a:r>
+            <a:r>
+              <a:rPr sz="1600" dirty="0" err="1"/>
+              <a:t>presencia</a:t>
+            </a:r>
+            <a:r>
+              <a:rPr sz="1600" dirty="0"/>
+              <a:t> de</a:t>
+            </a:r>
+            <a:r>
+              <a:rPr lang="es-ES" sz="1600" dirty="0"/>
+              <a:t> </a:t>
+            </a:r>
+            <a:r>
+              <a:rPr sz="1600" dirty="0" err="1"/>
+              <a:t>categorías</a:t>
+            </a:r>
+            <a:r>
+              <a:rPr sz="1600" dirty="0"/>
+              <a:t> clave</a:t>
+            </a:r>
+            <a:r>
+              <a:rPr lang="es-ES" sz="1600" dirty="0"/>
+              <a:t>.</a:t>
+            </a:r>
+            <a:endParaRPr sz="1600" dirty="0"/>
+          </a:p>
+          <a:p>
+            <a:pPr marL="342900" indent="-342900">
+              <a:buFont typeface="Arial" panose="020B0604020202020204" pitchFamily="34" charset="0"/>
+              <a:buChar char="•"/>
+              <a:defRPr sz="2000">
+                <a:solidFill>
+                  <a:srgbClr val="3C3C3C"/>
+                </a:solidFill>
+              </a:defRPr>
+            </a:pPr>
+            <a:r>
+              <a:rPr dirty="0" err="1"/>
+              <a:t>Precios</a:t>
+            </a:r>
+            <a:r>
+              <a:rPr dirty="0"/>
+              <a:t> y </a:t>
+            </a:r>
+            <a:r>
+              <a:rPr dirty="0" err="1"/>
+              <a:t>variaciones</a:t>
+            </a:r>
+            <a:r>
+              <a:rPr dirty="0"/>
+              <a:t> </a:t>
+            </a:r>
+            <a:r>
+              <a:rPr dirty="0" err="1"/>
+              <a:t>por</a:t>
+            </a:r>
+            <a:r>
+              <a:rPr dirty="0"/>
+              <a:t> zona</a:t>
+            </a:r>
+            <a:endParaRPr lang="es-ES" dirty="0"/>
           </a:p>
           <a:p>
             <a:pPr>
@@ -3565,8 +4056,90 @@
               </a:defRPr>
             </a:pPr>
             <a:r>
-              <a:t>Promociones activas</a:t>
-            </a:r>
+              <a:rPr lang="es-ES" dirty="0"/>
+              <a:t>	</a:t>
+            </a:r>
+            <a:r>
+              <a:rPr lang="es-ES" sz="1600" dirty="0"/>
+              <a:t>E</a:t>
+            </a:r>
+            <a:r>
+              <a:rPr sz="1600" dirty="0"/>
+              <a:t>studio de </a:t>
+            </a:r>
+            <a:r>
+              <a:rPr sz="1600" dirty="0" err="1"/>
+              <a:t>precios</a:t>
+            </a:r>
+            <a:r>
+              <a:rPr sz="1600" dirty="0"/>
+              <a:t> </a:t>
+            </a:r>
+            <a:r>
+              <a:rPr sz="1600" dirty="0" err="1"/>
+              <a:t>por</a:t>
+            </a:r>
+            <a:r>
+              <a:rPr sz="1600" dirty="0"/>
+              <a:t> </a:t>
+            </a:r>
+            <a:r>
+              <a:rPr sz="1600" dirty="0" err="1"/>
+              <a:t>código</a:t>
+            </a:r>
+            <a:r>
+              <a:rPr sz="1600" dirty="0"/>
+              <a:t> postal y </a:t>
+            </a:r>
+            <a:r>
+              <a:rPr sz="1600" dirty="0" err="1"/>
+              <a:t>detección</a:t>
+            </a:r>
+            <a:r>
+              <a:rPr sz="1600" dirty="0"/>
+              <a:t> de</a:t>
+            </a:r>
+            <a:r>
+              <a:rPr lang="es-ES" sz="1600" dirty="0"/>
+              <a:t> </a:t>
+            </a:r>
+            <a:r>
+              <a:rPr sz="1600" dirty="0" err="1"/>
+              <a:t>estrategias</a:t>
+            </a:r>
+            <a:r>
+              <a:rPr sz="1600" dirty="0"/>
+              <a:t> locales</a:t>
+            </a:r>
+            <a:r>
+              <a:rPr lang="es-ES" sz="1600" dirty="0"/>
+              <a:t>.</a:t>
+            </a:r>
+            <a:endParaRPr sz="1600" dirty="0"/>
+          </a:p>
+          <a:p>
+            <a:pPr marL="342900" indent="-342900">
+              <a:buFont typeface="Arial" panose="020B0604020202020204" pitchFamily="34" charset="0"/>
+              <a:buChar char="•"/>
+              <a:defRPr sz="2000">
+                <a:solidFill>
+                  <a:srgbClr val="3C3C3C"/>
+                </a:solidFill>
+              </a:defRPr>
+            </a:pPr>
+            <a:r>
+              <a:rPr dirty="0" err="1"/>
+              <a:t>Promociones</a:t>
+            </a:r>
+            <a:r>
+              <a:rPr dirty="0"/>
+              <a:t> </a:t>
+            </a:r>
+            <a:r>
+              <a:rPr dirty="0" err="1"/>
+              <a:t>activas</a:t>
+            </a:r>
+            <a:endParaRPr lang="es-ES" dirty="0"/>
           </a:p>
           <a:p>
             <a:pPr>
@@ -3577,8 +4150,114 @@
               </a:defRPr>
             </a:pPr>
             <a:r>
-              <a:t>Diferencias geográficas relevantes</a:t>
-            </a:r>
+              <a:rPr lang="es-ES" dirty="0"/>
+              <a:t>	</a:t>
+            </a:r>
+            <a:r>
+              <a:rPr lang="es-ES" sz="1600" dirty="0"/>
+              <a:t>I</a:t>
+            </a:r>
+            <a:r>
+              <a:rPr sz="1600" dirty="0" err="1"/>
+              <a:t>dentificación</a:t>
+            </a:r>
+            <a:r>
+              <a:rPr sz="1600" dirty="0"/>
+              <a:t> de </a:t>
+            </a:r>
+            <a:r>
+              <a:rPr sz="1600" dirty="0" err="1"/>
+              <a:t>tipos</a:t>
+            </a:r>
+            <a:r>
+              <a:rPr sz="1600" dirty="0"/>
+              <a:t> de </a:t>
+            </a:r>
+            <a:r>
+              <a:rPr sz="1600" dirty="0" err="1"/>
+              <a:t>promoción</a:t>
+            </a:r>
+            <a:r>
+              <a:rPr sz="1600" dirty="0"/>
+              <a:t> y </a:t>
+            </a:r>
+            <a:r>
+              <a:rPr sz="1600" dirty="0" err="1"/>
+              <a:t>su</a:t>
+            </a:r>
+            <a:r>
+              <a:rPr sz="1600" dirty="0"/>
+              <a:t> </a:t>
+            </a:r>
+            <a:r>
+              <a:rPr sz="1600" dirty="0" err="1"/>
+              <a:t>impacto</a:t>
+            </a:r>
+            <a:r>
+              <a:rPr sz="1600" dirty="0"/>
+              <a:t> </a:t>
+            </a:r>
+            <a:r>
+              <a:rPr sz="1600" dirty="0" err="1"/>
+              <a:t>sobre</a:t>
+            </a:r>
+            <a:r>
+              <a:rPr sz="1600" dirty="0"/>
+              <a:t> </a:t>
+            </a:r>
+            <a:r>
+              <a:rPr sz="1600" dirty="0" err="1"/>
+              <a:t>el</a:t>
+            </a:r>
+            <a:r>
+              <a:rPr sz="1600" dirty="0"/>
+              <a:t> </a:t>
+            </a:r>
+            <a:r>
+              <a:rPr sz="1600" dirty="0" err="1"/>
+              <a:t>precio</a:t>
+            </a:r>
+            <a:r>
+              <a:rPr sz="1600" dirty="0"/>
+              <a:t> final</a:t>
+            </a:r>
+            <a:r>
+              <a:rPr lang="es-ES" sz="1600" dirty="0"/>
+              <a:t>.</a:t>
+            </a:r>
+            <a:endParaRPr sz="1600" dirty="0"/>
+          </a:p>
+          <a:p>
+            <a:pPr marL="342900" indent="-342900">
+              <a:buFont typeface="Arial" panose="020B0604020202020204" pitchFamily="34" charset="0"/>
+              <a:buChar char="•"/>
+              <a:defRPr sz="2000">
+                <a:solidFill>
+                  <a:srgbClr val="3C3C3C"/>
+                </a:solidFill>
+              </a:defRPr>
+            </a:pPr>
+            <a:r>
+              <a:rPr dirty="0" err="1"/>
+              <a:t>Diferencias</a:t>
+            </a:r>
+            <a:r>
+              <a:rPr dirty="0"/>
+              <a:t> </a:t>
+            </a:r>
+            <a:r>
+              <a:rPr dirty="0" err="1"/>
+              <a:t>geográficas</a:t>
+            </a:r>
+            <a:r>
+              <a:rPr dirty="0"/>
+              <a:t> </a:t>
+            </a:r>
+            <a:r>
+              <a:rPr dirty="0" err="1"/>
+              <a:t>relevantes</a:t>
+            </a:r>
+            <a:endParaRPr lang="es-ES" dirty="0"/>
           </a:p>
           <a:p>
             <a:pPr>
@@ -3589,8 +4268,92 @@
               </a:defRPr>
             </a:pPr>
             <a:r>
-              <a:t>Ejemplo actual: DIA y Consum</a:t>
-            </a:r>
+              <a:rPr lang="es-ES" dirty="0"/>
+              <a:t>	</a:t>
+            </a:r>
+            <a:r>
+              <a:rPr lang="es-ES" sz="1600" dirty="0"/>
+              <a:t>C</a:t>
+            </a:r>
+            <a:r>
+              <a:rPr sz="1600" dirty="0" err="1"/>
+              <a:t>omparativa</a:t>
+            </a:r>
+            <a:r>
+              <a:rPr sz="1600" dirty="0"/>
+              <a:t> entre zonas de </a:t>
+            </a:r>
+            <a:r>
+              <a:rPr sz="1600" dirty="0" err="1"/>
+              <a:t>surtido</a:t>
+            </a:r>
+            <a:r>
+              <a:rPr sz="1600" dirty="0"/>
+              <a:t>, </a:t>
+            </a:r>
+            <a:r>
+              <a:rPr sz="1600" dirty="0" err="1"/>
+              <a:t>precios</a:t>
+            </a:r>
+            <a:r>
+              <a:rPr sz="1600" dirty="0"/>
+              <a:t> y </a:t>
+            </a:r>
+            <a:r>
+              <a:rPr sz="1600" dirty="0" err="1"/>
+              <a:t>promociones</a:t>
+            </a:r>
+            <a:r>
+              <a:rPr lang="es-ES" sz="1600" dirty="0"/>
+              <a:t>.</a:t>
+            </a:r>
+            <a:endParaRPr sz="1600" dirty="0"/>
+          </a:p>
+          <a:p>
+            <a:pPr marL="342900" indent="-342900">
+              <a:buFont typeface="Arial" panose="020B0604020202020204" pitchFamily="34" charset="0"/>
+              <a:buChar char="•"/>
+              <a:defRPr sz="2000">
+                <a:solidFill>
+                  <a:srgbClr val="3C3C3C"/>
+                </a:solidFill>
+              </a:defRPr>
+            </a:pPr>
+            <a:r>
+              <a:rPr dirty="0" err="1"/>
+              <a:t>Ejemplo</a:t>
+            </a:r>
+            <a:r>
+              <a:rPr dirty="0"/>
+              <a:t> actual</a:t>
+            </a:r>
+            <a:endParaRPr lang="es-ES" dirty="0"/>
+          </a:p>
+          <a:p>
+            <a:pPr>
+              <a:defRPr sz="2000">
+                <a:solidFill>
+                  <a:srgbClr val="3C3C3C"/>
+                </a:solidFill>
+              </a:defRPr>
+            </a:pPr>
+            <a:r>
+              <a:rPr lang="es-ES" dirty="0"/>
+              <a:t>	</a:t>
+            </a:r>
+            <a:r>
+              <a:rPr sz="1600" dirty="0"/>
+              <a:t>DIA y </a:t>
+            </a:r>
+            <a:r>
+              <a:rPr sz="1600" dirty="0" err="1"/>
+              <a:t>Consum</a:t>
+            </a:r>
+            <a:r>
+              <a:rPr lang="es-ES" sz="1600" dirty="0"/>
+              <a:t>.</a:t>
+            </a:r>
+            <a:endParaRPr sz="1600" dirty="0"/>
           </a:p>
         </p:txBody>
       </p:sp>
@@ -3603,23 +4366,22 @@
 </file>
 
 <file path=ppt/slides/slide5.xml><?xml version="1.0" encoding="utf-8"?>
-<p:sld xmlns:a="http://schemas.openxmlformats.org/drawingml/2006/main" xmlns:p="http://schemas.openxmlformats.org/presentationml/2006/main" xmlns:r="http://schemas.openxmlformats.org/officeDocument/2006/relationships">
+<p:sld xmlns:a="http://schemas.openxmlformats.org/drawingml/2006/main" xmlns:r="http://schemas.openxmlformats.org/officeDocument/2006/relationships" xmlns:p="http://schemas.openxmlformats.org/presentationml/2006/main">
   <p:cSld>
-    <p:bg>
-      <p:bgPr>
-        <a:solidFill>
-          <a:srgbClr val="F5F7FA"/>
-        </a:solidFill>
-        <a:effectLst/>
-      </p:bgPr>
-    </p:bg>
     <p:spTree>
       <p:nvGrpSpPr>
         <p:cNvPr id="1" name=""/>
         <p:cNvGrpSpPr/>
         <p:nvPr/>
       </p:nvGrpSpPr>
-      <p:grpSpPr/>
+      <p:grpSpPr>
+        <a:xfrm>
+          <a:off x="0" y="0"/>
+          <a:ext cx="0" cy="0"/>
+          <a:chOff x="0" y="0"/>
+          <a:chExt cx="0" cy="0"/>
+        </a:xfrm>
+      </p:grpSpPr>
       <p:sp>
         <p:nvSpPr>
           <p:cNvPr id="2" name="TextBox 1"/>
@@ -3643,7 +4405,7 @@
           <a:lstStyle/>
           <a:p>
             <a:pPr algn="l">
-              <a:defRPr sz="3200" b="1">
+              <a:defRPr sz="3400" b="1">
                 <a:solidFill>
                   <a:srgbClr val="284678"/>
                 </a:solidFill>
@@ -3663,8 +4425,8 @@
         </p:nvSpPr>
         <p:spPr>
           <a:xfrm>
-            <a:off x="1097280" y="2103120"/>
-            <a:ext cx="10058400" cy="4114800"/>
+            <a:off x="1097280" y="1737360"/>
+            <a:ext cx="10058400" cy="822960"/>
           </a:xfrm>
           <a:prstGeom prst="rect">
             <a:avLst/>
@@ -3678,13 +4440,51 @@
           <a:lstStyle/>
           <a:p>
             <a:pPr>
-              <a:defRPr sz="2000">
-                <a:solidFill>
-                  <a:srgbClr val="3C3C3C"/>
-                </a:solidFill>
-              </a:defRPr>
-            </a:pPr>
-            <a:r>
+              <a:defRPr sz="1800">
+                <a:solidFill>
+                  <a:srgbClr val="5A6E96"/>
+                </a:solidFill>
+              </a:defRPr>
+            </a:pPr>
+            <a:r>
+              <a:t>Diseñado desde el inicio para ser útil, robusto y escalable</a:t>
+            </a:r>
+          </a:p>
+        </p:txBody>
+      </p:sp>
+      <p:sp>
+        <p:nvSpPr>
+          <p:cNvPr id="4" name="TextBox 3"/>
+          <p:cNvSpPr txBox="1"/>
+          <p:nvPr/>
+        </p:nvSpPr>
+        <p:spPr>
+          <a:xfrm>
+            <a:off x="1097280" y="2244417"/>
+            <a:ext cx="6490562" cy="4401205"/>
+          </a:xfrm>
+          <a:prstGeom prst="rect">
+            <a:avLst/>
+          </a:prstGeom>
+          <a:noFill/>
+        </p:spPr>
+        <p:txBody>
+          <a:bodyPr wrap="square">
+            <a:spAutoFit/>
+          </a:bodyPr>
+          <a:lstStyle/>
+          <a:p>
+            <a:pPr marL="342900" indent="-342900">
+              <a:buFont typeface="Arial" panose="020B0604020202020204" pitchFamily="34" charset="0"/>
+              <a:buChar char="•"/>
+              <a:defRPr sz="2000">
+                <a:solidFill>
+                  <a:srgbClr val="3C3C3C"/>
+                </a:solidFill>
+              </a:defRPr>
+            </a:pPr>
+            <a:r>
+              <a:rPr lang="es-ES" sz="2000" dirty="0"/>
               <a:t>Desarrollo propio basado en necesidades reales del mercado</a:t>
             </a:r>
           </a:p>
@@ -3697,8 +4497,37 @@
               </a:defRPr>
             </a:pPr>
             <a:r>
-              <a:t>Uso de scripts específicos por retailer para adaptarse a cada web</a:t>
-            </a:r>
+              <a:rPr lang="es-ES" sz="1600" dirty="0"/>
+              <a:t>	El proyecto nace a partir de casos de uso concretos de análisis de 	mercado y </a:t>
+            </a:r>
+            <a:r>
+              <a:rPr lang="es-ES" sz="1600" dirty="0" err="1"/>
+              <a:t>pricing</a:t>
+            </a:r>
+            <a:r>
+              <a:rPr lang="es-ES" sz="1600" dirty="0"/>
+              <a:t>, no como un ejercicio técnico aislado.</a:t>
+            </a:r>
+          </a:p>
+          <a:p>
+            <a:pPr marL="342900" indent="-342900">
+              <a:buFont typeface="Arial" panose="020B0604020202020204" pitchFamily="34" charset="0"/>
+              <a:buChar char="•"/>
+              <a:defRPr sz="2000">
+                <a:solidFill>
+                  <a:srgbClr val="3C3C3C"/>
+                </a:solidFill>
+              </a:defRPr>
+            </a:pPr>
+            <a:r>
+              <a:rPr lang="es-ES" sz="2000" dirty="0"/>
+              <a:t>Uso de scripts específicos por </a:t>
+            </a:r>
+            <a:r>
+              <a:rPr lang="es-ES" sz="2000" dirty="0" err="1"/>
+              <a:t>retailer</a:t>
+            </a:r>
+            <a:endParaRPr lang="es-ES" sz="2000" dirty="0"/>
           </a:p>
           <a:p>
             <a:pPr>
@@ -3709,7 +4538,31 @@
               </a:defRPr>
             </a:pPr>
             <a:r>
-              <a:t>Separación clara entre obtención, tratamiento y almacenamiento de datos</a:t>
+              <a:rPr lang="es-ES" sz="1600" dirty="0"/>
+              <a:t>	Cada </a:t>
+            </a:r>
+            <a:r>
+              <a:rPr lang="es-ES" sz="1600" dirty="0" err="1"/>
+              <a:t>retailer</a:t>
+            </a:r>
+            <a:r>
+              <a:rPr lang="es-ES" sz="1600" dirty="0"/>
+              <a:t> dispone de su propia lógica de obtención de datos, 	permitiendo adaptarse a las particularidades de cada web y asegurar 	calidad de la información.</a:t>
+            </a:r>
+          </a:p>
+          <a:p>
+            <a:pPr marL="342900" indent="-342900">
+              <a:buFont typeface="Arial" panose="020B0604020202020204" pitchFamily="34" charset="0"/>
+              <a:buChar char="•"/>
+              <a:defRPr sz="2000">
+                <a:solidFill>
+                  <a:srgbClr val="3C3C3C"/>
+                </a:solidFill>
+              </a:defRPr>
+            </a:pPr>
+            <a:r>
+              <a:rPr lang="es-ES" sz="2000" dirty="0"/>
+              <a:t>Separación clara de responsabilidades</a:t>
             </a:r>
           </a:p>
           <a:p>
@@ -3721,8 +4574,55 @@
               </a:defRPr>
             </a:pPr>
             <a:r>
-              <a:t>Diseño modular pensado para escalar a nuevos retailers y países</a:t>
-            </a:r>
+              <a:rPr lang="es-ES" sz="1600" dirty="0"/>
+              <a:t>	Diferenciación entre la obtención de datos, su tratamiento y su 	almacenamiento, facilitando mantenimiento, control y evolución del 	sistema.</a:t>
+            </a:r>
+          </a:p>
+          <a:p>
+            <a:pPr marL="342900" indent="-342900">
+              <a:buFont typeface="Arial" panose="020B0604020202020204" pitchFamily="34" charset="0"/>
+              <a:buChar char="•"/>
+              <a:defRPr sz="2000">
+                <a:solidFill>
+                  <a:srgbClr val="3C3C3C"/>
+                </a:solidFill>
+              </a:defRPr>
+            </a:pPr>
+            <a:r>
+              <a:rPr lang="es-ES" sz="2000" dirty="0"/>
+              <a:t>Diseño modular y escalable</a:t>
+            </a:r>
+          </a:p>
+          <a:p>
+            <a:pPr>
+              <a:defRPr sz="2000">
+                <a:solidFill>
+                  <a:srgbClr val="3C3C3C"/>
+                </a:solidFill>
+              </a:defRPr>
+            </a:pPr>
+            <a:r>
+              <a:rPr lang="es-ES" sz="1600" dirty="0"/>
+              <a:t>	Arquitectura preparada para incorporar nuevos </a:t>
+            </a:r>
+            <a:r>
+              <a:rPr lang="es-ES" sz="1600" dirty="0" err="1"/>
+              <a:t>retailers</a:t>
+            </a:r>
+            <a:r>
+              <a:rPr lang="es-ES" sz="1600" dirty="0"/>
+              <a:t> y extender el 	análisis a otros países sin rehacer la base del proyecto.</a:t>
+            </a:r>
+          </a:p>
+          <a:p>
+            <a:pPr>
+              <a:defRPr sz="2000">
+                <a:solidFill>
+                  <a:srgbClr val="3C3C3C"/>
+                </a:solidFill>
+              </a:defRPr>
+            </a:pPr>
+            <a:endParaRPr dirty="0"/>
           </a:p>
         </p:txBody>
       </p:sp>
@@ -3735,23 +4635,22 @@
 </file>
 
 <file path=ppt/slides/slide6.xml><?xml version="1.0" encoding="utf-8"?>
-<p:sld xmlns:a="http://schemas.openxmlformats.org/drawingml/2006/main" xmlns:p="http://schemas.openxmlformats.org/presentationml/2006/main" xmlns:r="http://schemas.openxmlformats.org/officeDocument/2006/relationships">
+<p:sld xmlns:a="http://schemas.openxmlformats.org/drawingml/2006/main" xmlns:r="http://schemas.openxmlformats.org/officeDocument/2006/relationships" xmlns:p="http://schemas.openxmlformats.org/presentationml/2006/main">
   <p:cSld>
-    <p:bg>
-      <p:bgPr>
-        <a:solidFill>
-          <a:srgbClr val="F5F7FA"/>
-        </a:solidFill>
-        <a:effectLst/>
-      </p:bgPr>
-    </p:bg>
     <p:spTree>
       <p:nvGrpSpPr>
         <p:cNvPr id="1" name=""/>
         <p:cNvGrpSpPr/>
         <p:nvPr/>
       </p:nvGrpSpPr>
-      <p:grpSpPr/>
+      <p:grpSpPr>
+        <a:xfrm>
+          <a:off x="0" y="0"/>
+          <a:ext cx="0" cy="0"/>
+          <a:chOff x="0" y="0"/>
+          <a:chExt cx="0" cy="0"/>
+        </a:xfrm>
+      </p:grpSpPr>
       <p:sp>
         <p:nvSpPr>
           <p:cNvPr id="2" name="TextBox 1"/>
@@ -3775,7 +4674,7 @@
           <a:lstStyle/>
           <a:p>
             <a:pPr algn="l">
-              <a:defRPr sz="3200" b="1">
+              <a:defRPr sz="3400" b="1">
                 <a:solidFill>
                   <a:srgbClr val="284678"/>
                 </a:solidFill>
@@ -3795,8 +4694,8 @@
         </p:nvSpPr>
         <p:spPr>
           <a:xfrm>
-            <a:off x="1097280" y="2103120"/>
-            <a:ext cx="10058400" cy="4114800"/>
+            <a:off x="1097280" y="1737360"/>
+            <a:ext cx="10058400" cy="822960"/>
           </a:xfrm>
           <a:prstGeom prst="rect">
             <a:avLst/>
@@ -3810,15 +4709,58 @@
           <a:lstStyle/>
           <a:p>
             <a:pPr>
-              <a:defRPr sz="2000">
-                <a:solidFill>
-                  <a:srgbClr val="3C3C3C"/>
-                </a:solidFill>
-              </a:defRPr>
-            </a:pPr>
-            <a:r>
-              <a:t>Obtención automática de datos desde las webs de los retailers</a:t>
-            </a:r>
+              <a:defRPr sz="1800">
+                <a:solidFill>
+                  <a:srgbClr val="5A6E96"/>
+                </a:solidFill>
+              </a:defRPr>
+            </a:pPr>
+            <a:r>
+              <a:t>Un proceso automatizado, estructurado y repetible</a:t>
+            </a:r>
+          </a:p>
+        </p:txBody>
+      </p:sp>
+      <p:sp>
+        <p:nvSpPr>
+          <p:cNvPr id="4" name="TextBox 3"/>
+          <p:cNvSpPr txBox="1"/>
+          <p:nvPr/>
+        </p:nvSpPr>
+        <p:spPr>
+          <a:xfrm>
+            <a:off x="1097280" y="2242800"/>
+            <a:ext cx="6847094" cy="3847207"/>
+          </a:xfrm>
+          <a:prstGeom prst="rect">
+            <a:avLst/>
+          </a:prstGeom>
+          <a:noFill/>
+        </p:spPr>
+        <p:txBody>
+          <a:bodyPr wrap="square">
+            <a:spAutoFit/>
+          </a:bodyPr>
+          <a:lstStyle/>
+          <a:p>
+            <a:pPr marL="342900" indent="-342900">
+              <a:buFont typeface="Arial" panose="020B0604020202020204" pitchFamily="34" charset="0"/>
+              <a:buChar char="•"/>
+              <a:defRPr sz="2000">
+                <a:solidFill>
+                  <a:srgbClr val="3C3C3C"/>
+                </a:solidFill>
+              </a:defRPr>
+            </a:pPr>
+            <a:r>
+              <a:rPr lang="es-ES" sz="2000" dirty="0"/>
+              <a:t>Obtención automática de datos desde las webs de los </a:t>
+            </a:r>
+            <a:r>
+              <a:rPr lang="es-ES" sz="2000" dirty="0" err="1"/>
+              <a:t>retailers</a:t>
+            </a:r>
+            <a:endParaRPr lang="es-ES" sz="2000" dirty="0"/>
           </a:p>
           <a:p>
             <a:pPr>
@@ -3829,6 +4771,30 @@
               </a:defRPr>
             </a:pPr>
             <a:r>
+              <a:rPr lang="es-ES" sz="1600" dirty="0"/>
+              <a:t>	La información se recoge de forma automática desde las webs de los 	</a:t>
+            </a:r>
+            <a:r>
+              <a:rPr lang="es-ES" sz="1600" dirty="0" err="1"/>
+              <a:t>retailers</a:t>
+            </a:r>
+            <a:r>
+              <a:rPr lang="es-ES" sz="1600" dirty="0"/>
+              <a:t> online, garantizando consistencia y reduciendo intervención 	manual.</a:t>
+            </a:r>
+          </a:p>
+          <a:p>
+            <a:pPr marL="342900" indent="-342900">
+              <a:buFont typeface="Arial" panose="020B0604020202020204" pitchFamily="34" charset="0"/>
+              <a:buChar char="•"/>
+              <a:defRPr sz="2000">
+                <a:solidFill>
+                  <a:srgbClr val="3C3C3C"/>
+                </a:solidFill>
+              </a:defRPr>
+            </a:pPr>
+            <a:r>
+              <a:rPr lang="es-ES" sz="2000" dirty="0"/>
               <a:t>Aplicación de zonificación mediante código postal</a:t>
             </a:r>
           </a:p>
@@ -3841,6 +4807,22 @@
               </a:defRPr>
             </a:pPr>
             <a:r>
+              <a:rPr lang="es-ES" sz="1600" dirty="0"/>
+              <a:t>	El sistema simula la navegación por distintas zonas geográficas para 	capturar diferencias reales de surtido, precios y promociones.</a:t>
+            </a:r>
+          </a:p>
+          <a:p>
+            <a:pPr marL="342900" indent="-342900">
+              <a:buFont typeface="Arial" panose="020B0604020202020204" pitchFamily="34" charset="0"/>
+              <a:buChar char="•"/>
+              <a:defRPr sz="2000">
+                <a:solidFill>
+                  <a:srgbClr val="3C3C3C"/>
+                </a:solidFill>
+              </a:defRPr>
+            </a:pPr>
+            <a:r>
+              <a:rPr lang="es-ES" sz="2000" dirty="0"/>
               <a:t>Procesamiento y normalización de la información</a:t>
             </a:r>
           </a:p>
@@ -3853,8 +4835,38 @@
               </a:defRPr>
             </a:pPr>
             <a:r>
+              <a:rPr lang="es-ES" sz="1600" dirty="0"/>
+              <a:t>	Los datos obtenidos se tratan y organizan para asegurar coherencia, 	comparabilidad y calidad analítica.</a:t>
+            </a:r>
+          </a:p>
+          <a:p>
+            <a:pPr marL="342900" indent="-342900">
+              <a:buFont typeface="Arial" panose="020B0604020202020204" pitchFamily="34" charset="0"/>
+              <a:buChar char="•"/>
+              <a:defRPr sz="2000">
+                <a:solidFill>
+                  <a:srgbClr val="3C3C3C"/>
+                </a:solidFill>
+              </a:defRPr>
+            </a:pPr>
+            <a:r>
+              <a:rPr lang="es-ES" sz="2000" dirty="0"/>
               <a:t>Almacenamiento en una base de datos para su análisis</a:t>
             </a:r>
+          </a:p>
+          <a:p>
+            <a:pPr>
+              <a:defRPr sz="2000">
+                <a:solidFill>
+                  <a:srgbClr val="3C3C3C"/>
+                </a:solidFill>
+              </a:defRPr>
+            </a:pPr>
+            <a:r>
+              <a:rPr lang="es-ES" sz="1600" dirty="0"/>
+              <a:t>	La información se guarda de forma estructurada, permitiendo análisis 	posteriores, comparativas y estudios evolutivos.</a:t>
+            </a:r>
+            <a:endParaRPr sz="1600" dirty="0"/>
           </a:p>
         </p:txBody>
       </p:sp>
@@ -3867,23 +4879,22 @@
 </file>
 
 <file path=ppt/slides/slide7.xml><?xml version="1.0" encoding="utf-8"?>
-<p:sld xmlns:a="http://schemas.openxmlformats.org/drawingml/2006/main" xmlns:p="http://schemas.openxmlformats.org/presentationml/2006/main" xmlns:r="http://schemas.openxmlformats.org/officeDocument/2006/relationships">
+<p:sld xmlns:a="http://schemas.openxmlformats.org/drawingml/2006/main" xmlns:r="http://schemas.openxmlformats.org/officeDocument/2006/relationships" xmlns:p="http://schemas.openxmlformats.org/presentationml/2006/main">
   <p:cSld>
-    <p:bg>
-      <p:bgPr>
-        <a:solidFill>
-          <a:srgbClr val="F5F7FA"/>
-        </a:solidFill>
-        <a:effectLst/>
-      </p:bgPr>
-    </p:bg>
     <p:spTree>
       <p:nvGrpSpPr>
         <p:cNvPr id="1" name=""/>
         <p:cNvGrpSpPr/>
         <p:nvPr/>
       </p:nvGrpSpPr>
-      <p:grpSpPr/>
+      <p:grpSpPr>
+        <a:xfrm>
+          <a:off x="0" y="0"/>
+          <a:ext cx="0" cy="0"/>
+          <a:chOff x="0" y="0"/>
+          <a:chExt cx="0" cy="0"/>
+        </a:xfrm>
+      </p:grpSpPr>
       <p:sp>
         <p:nvSpPr>
           <p:cNvPr id="2" name="TextBox 1"/>
@@ -3907,7 +4918,7 @@
           <a:lstStyle/>
           <a:p>
             <a:pPr algn="l">
-              <a:defRPr sz="3200" b="1">
+              <a:defRPr sz="3400" b="1">
                 <a:solidFill>
                   <a:srgbClr val="284678"/>
                 </a:solidFill>
@@ -3927,8 +4938,8 @@
         </p:nvSpPr>
         <p:spPr>
           <a:xfrm>
-            <a:off x="1097280" y="2103120"/>
-            <a:ext cx="10058400" cy="4114800"/>
+            <a:off x="1097280" y="1737360"/>
+            <a:ext cx="10058400" cy="822960"/>
           </a:xfrm>
           <a:prstGeom prst="rect">
             <a:avLst/>
@@ -3942,13 +4953,51 @@
           <a:lstStyle/>
           <a:p>
             <a:pPr>
-              <a:defRPr sz="2000">
-                <a:solidFill>
-                  <a:srgbClr val="3C3C3C"/>
-                </a:solidFill>
-              </a:defRPr>
-            </a:pPr>
-            <a:r>
+              <a:defRPr sz="1800">
+                <a:solidFill>
+                  <a:srgbClr val="5A6E96"/>
+                </a:solidFill>
+              </a:defRPr>
+            </a:pPr>
+            <a:r>
+              <a:t>Una base tecnológica sencilla, robusta y mantenible</a:t>
+            </a:r>
+          </a:p>
+        </p:txBody>
+      </p:sp>
+      <p:sp>
+        <p:nvSpPr>
+          <p:cNvPr id="4" name="TextBox 3"/>
+          <p:cNvSpPr txBox="1"/>
+          <p:nvPr/>
+        </p:nvSpPr>
+        <p:spPr>
+          <a:xfrm>
+            <a:off x="1097280" y="2242800"/>
+            <a:ext cx="6578647" cy="3293209"/>
+          </a:xfrm>
+          <a:prstGeom prst="rect">
+            <a:avLst/>
+          </a:prstGeom>
+          <a:noFill/>
+        </p:spPr>
+        <p:txBody>
+          <a:bodyPr wrap="square">
+            <a:spAutoFit/>
+          </a:bodyPr>
+          <a:lstStyle/>
+          <a:p>
+            <a:pPr marL="342900" indent="-342900">
+              <a:buFont typeface="Arial" panose="020B0604020202020204" pitchFamily="34" charset="0"/>
+              <a:buChar char="•"/>
+              <a:defRPr sz="2000">
+                <a:solidFill>
+                  <a:srgbClr val="3C3C3C"/>
+                </a:solidFill>
+              </a:defRPr>
+            </a:pPr>
+            <a:r>
+              <a:rPr lang="es-ES" sz="2000" dirty="0"/>
               <a:t>Python como lenguaje principal de desarrollo</a:t>
             </a:r>
           </a:p>
@@ -3961,8 +5010,29 @@
               </a:defRPr>
             </a:pPr>
             <a:r>
-              <a:t>Scripts independientes adaptados a cada retailer</a:t>
-            </a:r>
+              <a:rPr lang="es-ES" sz="1600" dirty="0"/>
+              <a:t>	Utilizado para la obtención, tratamiento y carga de datos, permitiendo 	un desarrollo ágil, claro y fácilmente mantenible.</a:t>
+            </a:r>
+          </a:p>
+          <a:p>
+            <a:pPr marL="342900" indent="-342900">
+              <a:buFont typeface="Arial" panose="020B0604020202020204" pitchFamily="34" charset="0"/>
+              <a:buChar char="•"/>
+              <a:defRPr sz="2000">
+                <a:solidFill>
+                  <a:srgbClr val="3C3C3C"/>
+                </a:solidFill>
+              </a:defRPr>
+            </a:pPr>
+            <a:r>
+              <a:rPr lang="es-ES" sz="2000" dirty="0"/>
+              <a:t>Scripts independientes adaptados a cada </a:t>
+            </a:r>
+            <a:r>
+              <a:rPr lang="es-ES" sz="2000" dirty="0" err="1"/>
+              <a:t>retailer</a:t>
+            </a:r>
+            <a:endParaRPr lang="es-ES" sz="2000" dirty="0"/>
           </a:p>
           <a:p>
             <a:pPr>
@@ -3973,6 +5043,30 @@
               </a:defRPr>
             </a:pPr>
             <a:r>
+              <a:rPr lang="es-ES" sz="1600" dirty="0"/>
+              <a:t>	Cada </a:t>
+            </a:r>
+            <a:r>
+              <a:rPr lang="es-ES" sz="1600" dirty="0" err="1"/>
+              <a:t>retailer</a:t>
+            </a:r>
+            <a:r>
+              <a:rPr lang="es-ES" sz="1600" dirty="0"/>
+              <a:t> dispone de su propio script, lo que facilita la adaptación a 	cambios en las webs y reduce el impacto sobre el resto del sistema.</a:t>
+            </a:r>
+          </a:p>
+          <a:p>
+            <a:pPr marL="342900" indent="-342900">
+              <a:buFont typeface="Arial" panose="020B0604020202020204" pitchFamily="34" charset="0"/>
+              <a:buChar char="•"/>
+              <a:defRPr sz="2000">
+                <a:solidFill>
+                  <a:srgbClr val="3C3C3C"/>
+                </a:solidFill>
+              </a:defRPr>
+            </a:pPr>
+            <a:r>
+              <a:rPr lang="es-ES" sz="2000" dirty="0"/>
               <a:t>Archivos CSV como soporte de histórico</a:t>
             </a:r>
           </a:p>
@@ -3985,8 +5079,38 @@
               </a:defRPr>
             </a:pPr>
             <a:r>
+              <a:rPr lang="es-ES" sz="1600" dirty="0"/>
+              <a:t>	Los datos descargados se almacenan en archivos CSV, permitiendo 	conservar un histórico completo y separar la captura del análisis.</a:t>
+            </a:r>
+          </a:p>
+          <a:p>
+            <a:pPr marL="342900" indent="-342900">
+              <a:buFont typeface="Arial" panose="020B0604020202020204" pitchFamily="34" charset="0"/>
+              <a:buChar char="•"/>
+              <a:defRPr sz="2000">
+                <a:solidFill>
+                  <a:srgbClr val="3C3C3C"/>
+                </a:solidFill>
+              </a:defRPr>
+            </a:pPr>
+            <a:r>
+              <a:rPr lang="es-ES" sz="2000" dirty="0"/>
               <a:t>Base de datos MySQL para explotación y análisis</a:t>
             </a:r>
+          </a:p>
+          <a:p>
+            <a:pPr>
+              <a:defRPr sz="2000">
+                <a:solidFill>
+                  <a:srgbClr val="3C3C3C"/>
+                </a:solidFill>
+              </a:defRPr>
+            </a:pPr>
+            <a:r>
+              <a:rPr lang="es-ES" sz="1600" dirty="0"/>
+              <a:t>	La información final se centraliza en una base de datos estructurada, 	preparada para consultas, comparativas y análisis posteriores.</a:t>
+            </a:r>
+            <a:endParaRPr sz="1600" dirty="0"/>
           </a:p>
         </p:txBody>
       </p:sp>
@@ -3999,23 +5123,22 @@
 </file>
 
 <file path=ppt/slides/slide8.xml><?xml version="1.0" encoding="utf-8"?>
-<p:sld xmlns:a="http://schemas.openxmlformats.org/drawingml/2006/main" xmlns:p="http://schemas.openxmlformats.org/presentationml/2006/main" xmlns:r="http://schemas.openxmlformats.org/officeDocument/2006/relationships">
+<p:sld xmlns:a="http://schemas.openxmlformats.org/drawingml/2006/main" xmlns:r="http://schemas.openxmlformats.org/officeDocument/2006/relationships" xmlns:p="http://schemas.openxmlformats.org/presentationml/2006/main">
   <p:cSld>
-    <p:bg>
-      <p:bgPr>
-        <a:solidFill>
-          <a:srgbClr val="F5F7FA"/>
-        </a:solidFill>
-        <a:effectLst/>
-      </p:bgPr>
-    </p:bg>
     <p:spTree>
       <p:nvGrpSpPr>
         <p:cNvPr id="1" name=""/>
         <p:cNvGrpSpPr/>
         <p:nvPr/>
       </p:nvGrpSpPr>
-      <p:grpSpPr/>
+      <p:grpSpPr>
+        <a:xfrm>
+          <a:off x="0" y="0"/>
+          <a:ext cx="0" cy="0"/>
+          <a:chOff x="0" y="0"/>
+          <a:chExt cx="0" cy="0"/>
+        </a:xfrm>
+      </p:grpSpPr>
       <p:sp>
         <p:nvSpPr>
           <p:cNvPr id="2" name="TextBox 1"/>
@@ -4039,7 +5162,7 @@
           <a:lstStyle/>
           <a:p>
             <a:pPr algn="l">
-              <a:defRPr sz="3200" b="1">
+              <a:defRPr sz="3400" b="1">
                 <a:solidFill>
                   <a:srgbClr val="284678"/>
                 </a:solidFill>
@@ -4059,8 +5182,8 @@
         </p:nvSpPr>
         <p:spPr>
           <a:xfrm>
-            <a:off x="1097280" y="2103120"/>
-            <a:ext cx="10058400" cy="4114800"/>
+            <a:off x="1097280" y="1737360"/>
+            <a:ext cx="10058400" cy="822960"/>
           </a:xfrm>
           <a:prstGeom prst="rect">
             <a:avLst/>
@@ -4074,13 +5197,51 @@
           <a:lstStyle/>
           <a:p>
             <a:pPr>
-              <a:defRPr sz="2000">
-                <a:solidFill>
-                  <a:srgbClr val="3C3C3C"/>
-                </a:solidFill>
-              </a:defRPr>
-            </a:pPr>
-            <a:r>
+              <a:defRPr sz="1800">
+                <a:solidFill>
+                  <a:srgbClr val="5A6E96"/>
+                </a:solidFill>
+              </a:defRPr>
+            </a:pPr>
+            <a:r>
+              <a:t>Inteligencia de mercado aplicada a la toma de decisiones</a:t>
+            </a:r>
+          </a:p>
+        </p:txBody>
+      </p:sp>
+      <p:sp>
+        <p:nvSpPr>
+          <p:cNvPr id="4" name="TextBox 3"/>
+          <p:cNvSpPr txBox="1"/>
+          <p:nvPr/>
+        </p:nvSpPr>
+        <p:spPr>
+          <a:xfrm>
+            <a:off x="1097280" y="2242800"/>
+            <a:ext cx="6975093" cy="3416320"/>
+          </a:xfrm>
+          <a:prstGeom prst="rect">
+            <a:avLst/>
+          </a:prstGeom>
+          <a:noFill/>
+        </p:spPr>
+        <p:txBody>
+          <a:bodyPr wrap="square">
+            <a:spAutoFit/>
+          </a:bodyPr>
+          <a:lstStyle/>
+          <a:p>
+            <a:pPr marL="342900" indent="-342900">
+              <a:buFont typeface="Arial" panose="020B0604020202020204" pitchFamily="34" charset="0"/>
+              <a:buChar char="•"/>
+              <a:defRPr sz="2000">
+                <a:solidFill>
+                  <a:srgbClr val="3C3C3C"/>
+                </a:solidFill>
+              </a:defRPr>
+            </a:pPr>
+            <a:r>
+              <a:rPr lang="es-ES" sz="2000" dirty="0"/>
               <a:t>Visión clara y objetiva del mercado online</a:t>
             </a:r>
           </a:p>
@@ -4093,8 +5254,29 @@
               </a:defRPr>
             </a:pPr>
             <a:r>
-              <a:t>Soporte directo a decisiones de pricing</a:t>
-            </a:r>
+              <a:rPr lang="es-ES" sz="1600" dirty="0"/>
+              <a:t>	Acceso a una imagen estructurada y comparable del mercado, basada en 	datos reales y actualizados.</a:t>
+            </a:r>
+          </a:p>
+          <a:p>
+            <a:pPr marL="342900" indent="-342900">
+              <a:buFont typeface="Arial" panose="020B0604020202020204" pitchFamily="34" charset="0"/>
+              <a:buChar char="•"/>
+              <a:defRPr sz="2000">
+                <a:solidFill>
+                  <a:srgbClr val="3C3C3C"/>
+                </a:solidFill>
+              </a:defRPr>
+            </a:pPr>
+            <a:r>
+              <a:rPr lang="es-ES" sz="2000" dirty="0"/>
+              <a:t>Soporte directo a decisiones de </a:t>
+            </a:r>
+            <a:r>
+              <a:rPr lang="es-ES" sz="2000" dirty="0" err="1"/>
+              <a:t>pricing</a:t>
+            </a:r>
+            <a:endParaRPr lang="es-ES" sz="2000" dirty="0"/>
           </a:p>
           <a:p>
             <a:pPr>
@@ -4105,6 +5287,22 @@
               </a:defRPr>
             </a:pPr>
             <a:r>
+              <a:rPr lang="es-ES" sz="1600" dirty="0"/>
+              <a:t>	Información fiable para definir, ajustar y validar estrategias de precios en 	función del mercado y la zona geográfica.</a:t>
+            </a:r>
+          </a:p>
+          <a:p>
+            <a:pPr marL="342900" indent="-342900">
+              <a:buFont typeface="Arial" panose="020B0604020202020204" pitchFamily="34" charset="0"/>
+              <a:buChar char="•"/>
+              <a:defRPr sz="2000">
+                <a:solidFill>
+                  <a:srgbClr val="3C3C3C"/>
+                </a:solidFill>
+              </a:defRPr>
+            </a:pPr>
+            <a:r>
+              <a:rPr lang="es-ES" sz="2000" dirty="0"/>
               <a:t>Análisis competitivo continuo y actualizado</a:t>
             </a:r>
           </a:p>
@@ -4117,8 +5315,38 @@
               </a:defRPr>
             </a:pPr>
             <a:r>
+              <a:rPr lang="es-ES" sz="1600" dirty="0"/>
+              <a:t>	Seguimiento periódico de surtido, precios y promociones de los principales 	competidores.</a:t>
+            </a:r>
+          </a:p>
+          <a:p>
+            <a:pPr marL="342900" indent="-342900">
+              <a:buFont typeface="Arial" panose="020B0604020202020204" pitchFamily="34" charset="0"/>
+              <a:buChar char="•"/>
+              <a:defRPr sz="2000">
+                <a:solidFill>
+                  <a:srgbClr val="3C3C3C"/>
+                </a:solidFill>
+              </a:defRPr>
+            </a:pPr>
+            <a:r>
+              <a:rPr lang="es-ES" sz="2000" dirty="0"/>
               <a:t>Servicio escalable con alta demanda en el sector</a:t>
             </a:r>
+          </a:p>
+          <a:p>
+            <a:pPr>
+              <a:defRPr sz="2000">
+                <a:solidFill>
+                  <a:srgbClr val="3C3C3C"/>
+                </a:solidFill>
+              </a:defRPr>
+            </a:pPr>
+            <a:r>
+              <a:rPr lang="es-ES" sz="1600" dirty="0"/>
+              <a:t>	Solución preparada para crecer en alcance, volumen de datos y número de 	clientes, en un mercado con creciente necesidad de este tipo de análisis.</a:t>
+            </a:r>
+            <a:endParaRPr sz="1600" dirty="0"/>
           </a:p>
         </p:txBody>
       </p:sp>
@@ -4131,23 +5359,22 @@
 </file>
 
 <file path=ppt/slides/slide9.xml><?xml version="1.0" encoding="utf-8"?>
-<p:sld xmlns:a="http://schemas.openxmlformats.org/drawingml/2006/main" xmlns:p="http://schemas.openxmlformats.org/presentationml/2006/main" xmlns:r="http://schemas.openxmlformats.org/officeDocument/2006/relationships">
+<p:sld xmlns:a="http://schemas.openxmlformats.org/drawingml/2006/main" xmlns:r="http://schemas.openxmlformats.org/officeDocument/2006/relationships" xmlns:p="http://schemas.openxmlformats.org/presentationml/2006/main">
   <p:cSld>
-    <p:bg>
-      <p:bgPr>
-        <a:solidFill>
-          <a:srgbClr val="F5F7FA"/>
-        </a:solidFill>
-        <a:effectLst/>
-      </p:bgPr>
-    </p:bg>
     <p:spTree>
       <p:nvGrpSpPr>
         <p:cNvPr id="1" name=""/>
         <p:cNvGrpSpPr/>
         <p:nvPr/>
       </p:nvGrpSpPr>
-      <p:grpSpPr/>
+      <p:grpSpPr>
+        <a:xfrm>
+          <a:off x="0" y="0"/>
+          <a:ext cx="0" cy="0"/>
+          <a:chOff x="0" y="0"/>
+          <a:chExt cx="0" cy="0"/>
+        </a:xfrm>
+      </p:grpSpPr>
       <p:sp>
         <p:nvSpPr>
           <p:cNvPr id="2" name="TextBox 1"/>
@@ -4171,7 +5398,7 @@
           <a:lstStyle/>
           <a:p>
             <a:pPr algn="l">
-              <a:defRPr sz="3200" b="1">
+              <a:defRPr sz="3400" b="1">
                 <a:solidFill>
                   <a:srgbClr val="284678"/>
                 </a:solidFill>
@@ -4191,8 +5418,8 @@
         </p:nvSpPr>
         <p:spPr>
           <a:xfrm>
-            <a:off x="1097280" y="2103120"/>
-            <a:ext cx="10058400" cy="4114800"/>
+            <a:off x="1097280" y="1737360"/>
+            <a:ext cx="10058400" cy="822960"/>
           </a:xfrm>
           <a:prstGeom prst="rect">
             <a:avLst/>
@@ -4206,14 +5433,60 @@
           <a:lstStyle/>
           <a:p>
             <a:pPr>
-              <a:defRPr sz="2000">
-                <a:solidFill>
-                  <a:srgbClr val="3C3C3C"/>
-                </a:solidFill>
-              </a:defRPr>
-            </a:pPr>
-            <a:r>
-              <a:t>Incorporar nuevos retailers al servicio</a:t>
+              <a:defRPr sz="1800">
+                <a:solidFill>
+                  <a:srgbClr val="5A6E96"/>
+                </a:solidFill>
+              </a:defRPr>
+            </a:pPr>
+            <a:r>
+              <a:t>Escalar el servicio y consolidarlo como producto de referencia</a:t>
+            </a:r>
+          </a:p>
+        </p:txBody>
+      </p:sp>
+      <p:sp>
+        <p:nvSpPr>
+          <p:cNvPr id="4" name="TextBox 3"/>
+          <p:cNvSpPr txBox="1"/>
+          <p:nvPr/>
+        </p:nvSpPr>
+        <p:spPr>
+          <a:xfrm>
+            <a:off x="1097280" y="2242800"/>
+            <a:ext cx="6697877" cy="3600986"/>
+          </a:xfrm>
+          <a:prstGeom prst="rect">
+            <a:avLst/>
+          </a:prstGeom>
+          <a:noFill/>
+        </p:spPr>
+        <p:txBody>
+          <a:bodyPr wrap="square">
+            <a:spAutoFit/>
+          </a:bodyPr>
+          <a:lstStyle/>
+          <a:p>
+            <a:pPr marL="342900" indent="-342900">
+              <a:buFont typeface="Arial" panose="020B0604020202020204" pitchFamily="34" charset="0"/>
+              <a:buChar char="•"/>
+              <a:defRPr sz="2000">
+                <a:solidFill>
+                  <a:srgbClr val="3C3C3C"/>
+                </a:solidFill>
+              </a:defRPr>
+            </a:pPr>
+            <a:r>
+              <a:rPr lang="es-ES" sz="2000" dirty="0"/>
+              <a:t>Incorporar nuevos </a:t>
+            </a:r>
+            <a:r>
+              <a:rPr lang="es-ES" sz="2000" dirty="0" err="1"/>
+              <a:t>retailers</a:t>
+            </a:r>
+            <a:r>
+              <a:rPr lang="es-ES" sz="2000" dirty="0"/>
+              <a:t> al servicio</a:t>
             </a:r>
           </a:p>
           <a:p>
@@ -4225,8 +5498,29 @@
               </a:defRPr>
             </a:pPr>
             <a:r>
-              <a:t>Crear comparativas entre retailers</a:t>
-            </a:r>
+              <a:rPr lang="es-ES" sz="1600" dirty="0"/>
+              <a:t>	Ampliar progresivamente la cobertura del mercado para aumentar el 	valor del análisis y el interés para los clientes.</a:t>
+            </a:r>
+          </a:p>
+          <a:p>
+            <a:pPr marL="342900" indent="-342900">
+              <a:buFont typeface="Arial" panose="020B0604020202020204" pitchFamily="34" charset="0"/>
+              <a:buChar char="•"/>
+              <a:defRPr sz="2000">
+                <a:solidFill>
+                  <a:srgbClr val="3C3C3C"/>
+                </a:solidFill>
+              </a:defRPr>
+            </a:pPr>
+            <a:r>
+              <a:rPr lang="es-ES" sz="2000" dirty="0"/>
+              <a:t>Crear comparativas entre </a:t>
+            </a:r>
+            <a:r>
+              <a:rPr lang="es-ES" sz="2000" dirty="0" err="1"/>
+              <a:t>retailers</a:t>
+            </a:r>
+            <a:endParaRPr lang="es-ES" sz="2000" dirty="0"/>
           </a:p>
           <a:p>
             <a:pPr>
@@ -4237,6 +5531,22 @@
               </a:defRPr>
             </a:pPr>
             <a:r>
+              <a:rPr lang="es-ES" sz="1600" dirty="0"/>
+              <a:t>	Permitir análisis directos entre competidores en términos de surtido, 	precios y promociones, facilitando la toma de decisiones estratégicas.</a:t>
+            </a:r>
+          </a:p>
+          <a:p>
+            <a:pPr marL="342900" indent="-342900">
+              <a:buFont typeface="Arial" panose="020B0604020202020204" pitchFamily="34" charset="0"/>
+              <a:buChar char="•"/>
+              <a:defRPr sz="2000">
+                <a:solidFill>
+                  <a:srgbClr val="3C3C3C"/>
+                </a:solidFill>
+              </a:defRPr>
+            </a:pPr>
+            <a:r>
+              <a:rPr lang="es-ES" sz="2000" dirty="0"/>
               <a:t>Normalizar categorías, promociones y marcas</a:t>
             </a:r>
           </a:p>
@@ -4249,8 +5559,54 @@
               </a:defRPr>
             </a:pPr>
             <a:r>
-              <a:t>Desarrollar una plataforma web con dashboards y descargas</a:t>
-            </a:r>
+              <a:rPr lang="es-ES" sz="1600" dirty="0"/>
+              <a:t>	Definir estructuras maestras comunes que permitan comparaciones 	homogéneas y análisis más profundos entre distintos </a:t>
+            </a:r>
+            <a:r>
+              <a:rPr lang="es-ES" sz="1600" dirty="0" err="1"/>
+              <a:t>retailers</a:t>
+            </a:r>
+            <a:r>
+              <a:rPr lang="es-ES" sz="1600" dirty="0"/>
+              <a:t>.</a:t>
+            </a:r>
+          </a:p>
+          <a:p>
+            <a:pPr marL="342900" indent="-342900">
+              <a:buFont typeface="Arial" panose="020B0604020202020204" pitchFamily="34" charset="0"/>
+              <a:buChar char="•"/>
+              <a:defRPr sz="2000">
+                <a:solidFill>
+                  <a:srgbClr val="3C3C3C"/>
+                </a:solidFill>
+              </a:defRPr>
+            </a:pPr>
+            <a:r>
+              <a:rPr lang="es-ES" sz="2000" dirty="0"/>
+              <a:t>Desarrollar una plataforma web con </a:t>
+            </a:r>
+            <a:r>
+              <a:rPr lang="es-ES" sz="2000" dirty="0" err="1"/>
+              <a:t>dashboards</a:t>
+            </a:r>
+            <a:r>
+              <a:rPr lang="es-ES" sz="2000" dirty="0"/>
+              <a:t> y descargas</a:t>
+            </a:r>
+          </a:p>
+          <a:p>
+            <a:pPr>
+              <a:defRPr sz="2000">
+                <a:solidFill>
+                  <a:srgbClr val="3C3C3C"/>
+                </a:solidFill>
+              </a:defRPr>
+            </a:pPr>
+            <a:r>
+              <a:rPr lang="es-ES" sz="1600" dirty="0"/>
+              <a:t>	Evolucionar el servicio hacia una solución digital para clientes, con acceso 	visual a la información, filtros de análisis y descarga de datos.</a:t>
+            </a:r>
+            <a:endParaRPr sz="1600" dirty="0"/>
           </a:p>
         </p:txBody>
       </p:sp>

</xml_diff>